<commit_message>
Update, plus scraping for wa counties working
</commit_message>
<xml_diff>
--- a/_teaching/csci112-fall-2023/lectures/ppts/Chapter6.pptx
+++ b/_teaching/csci112-fall-2023/lectures/ppts/Chapter6.pptx
@@ -5,7 +5,7 @@
     <p:sldMasterId id="2147483696" r:id="rId1"/>
   </p:sldMasterIdLst>
   <p:notesMasterIdLst>
-    <p:notesMasterId r:id="rId32"/>
+    <p:notesMasterId r:id="rId33"/>
   </p:notesMasterIdLst>
   <p:sldIdLst>
     <p:sldId id="256" r:id="rId2"/>
@@ -16,28 +16,29 @@
     <p:sldId id="306" r:id="rId7"/>
     <p:sldId id="307" r:id="rId8"/>
     <p:sldId id="272" r:id="rId9"/>
-    <p:sldId id="324" r:id="rId10"/>
-    <p:sldId id="273" r:id="rId11"/>
-    <p:sldId id="274" r:id="rId12"/>
-    <p:sldId id="314" r:id="rId13"/>
-    <p:sldId id="315" r:id="rId14"/>
-    <p:sldId id="311" r:id="rId15"/>
-    <p:sldId id="313" r:id="rId16"/>
-    <p:sldId id="312" r:id="rId17"/>
-    <p:sldId id="310" r:id="rId18"/>
-    <p:sldId id="309" r:id="rId19"/>
-    <p:sldId id="317" r:id="rId20"/>
-    <p:sldId id="319" r:id="rId21"/>
-    <p:sldId id="320" r:id="rId22"/>
-    <p:sldId id="322" r:id="rId23"/>
-    <p:sldId id="321" r:id="rId24"/>
-    <p:sldId id="323" r:id="rId25"/>
-    <p:sldId id="277" r:id="rId26"/>
-    <p:sldId id="282" r:id="rId27"/>
-    <p:sldId id="283" r:id="rId28"/>
-    <p:sldId id="284" r:id="rId29"/>
-    <p:sldId id="285" r:id="rId30"/>
-    <p:sldId id="289" r:id="rId31"/>
+    <p:sldId id="273" r:id="rId10"/>
+    <p:sldId id="274" r:id="rId11"/>
+    <p:sldId id="314" r:id="rId12"/>
+    <p:sldId id="315" r:id="rId13"/>
+    <p:sldId id="325" r:id="rId14"/>
+    <p:sldId id="324" r:id="rId15"/>
+    <p:sldId id="311" r:id="rId16"/>
+    <p:sldId id="313" r:id="rId17"/>
+    <p:sldId id="312" r:id="rId18"/>
+    <p:sldId id="310" r:id="rId19"/>
+    <p:sldId id="309" r:id="rId20"/>
+    <p:sldId id="317" r:id="rId21"/>
+    <p:sldId id="319" r:id="rId22"/>
+    <p:sldId id="320" r:id="rId23"/>
+    <p:sldId id="322" r:id="rId24"/>
+    <p:sldId id="321" r:id="rId25"/>
+    <p:sldId id="323" r:id="rId26"/>
+    <p:sldId id="277" r:id="rId27"/>
+    <p:sldId id="282" r:id="rId28"/>
+    <p:sldId id="283" r:id="rId29"/>
+    <p:sldId id="284" r:id="rId30"/>
+    <p:sldId id="285" r:id="rId31"/>
+    <p:sldId id="289" r:id="rId32"/>
   </p:sldIdLst>
   <p:sldSz cx="9144000" cy="6858000" type="screen4x3"/>
   <p:notesSz cx="6858000" cy="9144000"/>
@@ -3747,21 +3748,32 @@
           <a:lstStyle/>
           <a:p>
             <a:r>
-              <a:rPr lang="en-US" dirty="0"/>
-              <a:t>C allows a program to explicitly name a file for input or output.</a:t>
-            </a:r>
-          </a:p>
-          <a:p>
-            <a:r>
-              <a:rPr lang="en-US" dirty="0"/>
-              <a:t>Declare file pointers:</a:t>
-            </a:r>
+              <a:rPr lang="en-US" dirty="0" err="1"/>
+              <a:t>fscanf</a:t>
+            </a:r>
+            <a:endParaRPr lang="en-US" dirty="0"/>
           </a:p>
           <a:p>
             <a:pPr lvl="1"/>
             <a:r>
               <a:rPr lang="en-US" dirty="0"/>
-              <a:t>FILE  *</a:t>
+              <a:t>file equivalent of </a:t>
+            </a:r>
+            <a:r>
+              <a:rPr lang="en-US" dirty="0" err="1"/>
+              <a:t>scanf</a:t>
+            </a:r>
+            <a:endParaRPr lang="en-US" dirty="0"/>
+          </a:p>
+          <a:p>
+            <a:pPr lvl="1"/>
+            <a:r>
+              <a:rPr lang="en-US" dirty="0" err="1"/>
+              <a:t>fscanf</a:t>
+            </a:r>
+            <a:r>
+              <a:rPr lang="en-US" dirty="0"/>
+              <a:t>(</a:t>
             </a:r>
             <a:r>
               <a:rPr lang="en-US" dirty="0" err="1"/>
@@ -3769,14 +3781,45 @@
             </a:r>
             <a:r>
               <a:rPr lang="en-US" dirty="0"/>
-              <a:t>;	/* pointer to input file */</a:t>
-            </a:r>
+              <a:t>, “%</a:t>
+            </a:r>
+            <a:r>
+              <a:rPr lang="en-US" dirty="0" err="1"/>
+              <a:t>lf</a:t>
+            </a:r>
+            <a:r>
+              <a:rPr lang="en-US" dirty="0"/>
+              <a:t>”, &amp;item);</a:t>
+            </a:r>
+          </a:p>
+          <a:p>
+            <a:r>
+              <a:rPr lang="en-US" dirty="0" err="1"/>
+              <a:t>fprintf</a:t>
+            </a:r>
+            <a:endParaRPr lang="en-US" dirty="0"/>
           </a:p>
           <a:p>
             <a:pPr lvl="1"/>
             <a:r>
               <a:rPr lang="en-US" dirty="0"/>
-              <a:t>FILE  *</a:t>
+              <a:t>file equivalent of </a:t>
+            </a:r>
+            <a:r>
+              <a:rPr lang="en-US" dirty="0" err="1"/>
+              <a:t>printf</a:t>
+            </a:r>
+            <a:endParaRPr lang="en-US" dirty="0"/>
+          </a:p>
+          <a:p>
+            <a:pPr lvl="1"/>
+            <a:r>
+              <a:rPr lang="en-US" dirty="0" err="1"/>
+              <a:t>fprintf</a:t>
+            </a:r>
+            <a:r>
+              <a:rPr lang="en-US" dirty="0"/>
+              <a:t>(</a:t>
             </a:r>
             <a:r>
               <a:rPr lang="en-US" dirty="0" err="1"/>
@@ -3784,51 +3827,51 @@
             </a:r>
             <a:r>
               <a:rPr lang="en-US" dirty="0"/>
-              <a:t>;	/* pointer to output file */</a:t>
-            </a:r>
-          </a:p>
-          <a:p>
-            <a:r>
-              <a:rPr lang="en-US" dirty="0"/>
-              <a:t>Prepare for input or output before permitting access:</a:t>
+              <a:t>, “%.2f\n”, item);</a:t>
+            </a:r>
+          </a:p>
+          <a:p>
+            <a:r>
+              <a:rPr lang="en-US" dirty="0"/>
+              <a:t>closing a file when done</a:t>
             </a:r>
           </a:p>
           <a:p>
             <a:pPr lvl="1"/>
+            <a:r>
+              <a:rPr lang="en-US" dirty="0" err="1"/>
+              <a:t>fclose</a:t>
+            </a:r>
+            <a:r>
+              <a:rPr lang="en-US" dirty="0"/>
+              <a:t>(</a:t>
+            </a:r>
             <a:r>
               <a:rPr lang="en-US" dirty="0" err="1"/>
               <a:t>inp</a:t>
             </a:r>
             <a:r>
               <a:rPr lang="en-US" dirty="0"/>
-              <a:t> = </a:t>
-            </a:r>
+              <a:t>);</a:t>
+            </a:r>
+          </a:p>
+          <a:p>
+            <a:pPr lvl="1"/>
             <a:r>
               <a:rPr lang="en-US" dirty="0" err="1"/>
-              <a:t>fopen</a:t>
-            </a:r>
-            <a:r>
-              <a:rPr lang="en-US" dirty="0"/>
-              <a:t>(“infile.txt”, “r”);</a:t>
-            </a:r>
-          </a:p>
-          <a:p>
-            <a:pPr lvl="1"/>
+              <a:t>fclose</a:t>
+            </a:r>
+            <a:r>
+              <a:rPr lang="en-US" dirty="0"/>
+              <a:t>(</a:t>
+            </a:r>
             <a:r>
               <a:rPr lang="en-US" dirty="0" err="1"/>
               <a:t>outp</a:t>
             </a:r>
             <a:r>
               <a:rPr lang="en-US" dirty="0"/>
-              <a:t> = </a:t>
-            </a:r>
-            <a:r>
-              <a:rPr lang="en-US" dirty="0" err="1"/>
-              <a:t>fopen</a:t>
-            </a:r>
-            <a:r>
-              <a:rPr lang="en-US" dirty="0"/>
-              <a:t>(“outfile.txt”, “w”);</a:t>
+              <a:t>);</a:t>
             </a:r>
           </a:p>
         </p:txBody>
@@ -3881,7 +3924,7 @@
     </p:spTree>
     <p:extLst>
       <p:ext uri="{BB962C8B-B14F-4D97-AF65-F5344CB8AC3E}">
-        <p14:creationId xmlns:p14="http://schemas.microsoft.com/office/powerpoint/2010/main" val="3134779782"/>
+        <p14:creationId xmlns:p14="http://schemas.microsoft.com/office/powerpoint/2010/main" val="2063610620"/>
       </p:ext>
     </p:extLst>
   </p:cSld>
@@ -3910,7 +3953,13 @@
       </p:grpSpPr>
       <p:sp>
         <p:nvSpPr>
-          <p:cNvPr id="2" name="Title 1"/>
+          <p:cNvPr id="2" name="Title 1">
+            <a:extLst>
+              <a:ext uri="{FF2B5EF4-FFF2-40B4-BE49-F238E27FC236}">
+                <a16:creationId xmlns:a16="http://schemas.microsoft.com/office/drawing/2014/main" id="{E76389D1-2CC6-A240-8D8A-81D6153E0ACB}"/>
+              </a:ext>
+            </a:extLst>
+          </p:cNvPr>
           <p:cNvSpPr>
             <a:spLocks noGrp="1"/>
           </p:cNvSpPr>
@@ -3925,14 +3974,20 @@
           <a:p>
             <a:r>
               <a:rPr lang="en-US" dirty="0"/>
-              <a:t>Pointers to Files</a:t>
-            </a:r>
-          </a:p>
-        </p:txBody>
-      </p:sp>
-      <p:sp>
-        <p:nvSpPr>
-          <p:cNvPr id="3" name="Content Placeholder 2"/>
+              <a:t>Segmentation fault</a:t>
+            </a:r>
+          </a:p>
+        </p:txBody>
+      </p:sp>
+      <p:sp>
+        <p:nvSpPr>
+          <p:cNvPr id="3" name="Content Placeholder 2">
+            <a:extLst>
+              <a:ext uri="{FF2B5EF4-FFF2-40B4-BE49-F238E27FC236}">
+                <a16:creationId xmlns:a16="http://schemas.microsoft.com/office/drawing/2014/main" id="{2C9F0F02-7F11-1B46-9910-9EDC3E0EB4AB}"/>
+              </a:ext>
+            </a:extLst>
+          </p:cNvPr>
           <p:cNvSpPr>
             <a:spLocks noGrp="1"/>
           </p:cNvSpPr>
@@ -3942,143 +3997,58 @@
         </p:nvSpPr>
         <p:spPr/>
         <p:txBody>
-          <a:bodyPr>
-            <a:normAutofit lnSpcReduction="10000"/>
-          </a:bodyPr>
-          <a:lstStyle/>
-          <a:p>
-            <a:r>
-              <a:rPr lang="en-US" dirty="0" err="1"/>
-              <a:t>fscanf</a:t>
-            </a:r>
-            <a:endParaRPr lang="en-US" dirty="0"/>
+          <a:bodyPr/>
+          <a:lstStyle/>
+          <a:p>
+            <a:r>
+              <a:rPr lang="en-US" dirty="0"/>
+              <a:t>Runtime error</a:t>
+            </a:r>
+          </a:p>
+          <a:p>
+            <a:r>
+              <a:rPr lang="en-US" dirty="0"/>
+              <a:t>Means you tried to access memory that you weren’t allowed to access</a:t>
+            </a:r>
+          </a:p>
+          <a:p>
+            <a:r>
+              <a:rPr lang="en-US" dirty="0"/>
+              <a:t>Examples of causes:</a:t>
+            </a:r>
           </a:p>
           <a:p>
             <a:pPr lvl="1"/>
             <a:r>
               <a:rPr lang="en-US" dirty="0"/>
-              <a:t>file equivalent of </a:t>
-            </a:r>
-            <a:r>
-              <a:rPr lang="en-US" dirty="0" err="1"/>
-              <a:t>scanf</a:t>
-            </a:r>
-            <a:endParaRPr lang="en-US" dirty="0"/>
+              <a:t>trying to read from a file that wasn’t open</a:t>
+            </a:r>
           </a:p>
           <a:p>
             <a:pPr lvl="1"/>
             <a:r>
-              <a:rPr lang="en-US" dirty="0" err="1"/>
-              <a:t>fscanf</a:t>
-            </a:r>
-            <a:r>
-              <a:rPr lang="en-US" dirty="0"/>
-              <a:t>(</a:t>
-            </a:r>
-            <a:r>
-              <a:rPr lang="en-US" dirty="0" err="1"/>
-              <a:t>inp</a:t>
-            </a:r>
-            <a:r>
-              <a:rPr lang="en-US" dirty="0"/>
-              <a:t>, “%</a:t>
-            </a:r>
-            <a:r>
-              <a:rPr lang="en-US" dirty="0" err="1"/>
-              <a:t>lf</a:t>
-            </a:r>
-            <a:r>
-              <a:rPr lang="en-US" dirty="0"/>
-              <a:t>”, &amp;item);</a:t>
-            </a:r>
-          </a:p>
-          <a:p>
-            <a:r>
-              <a:rPr lang="en-US" dirty="0" err="1"/>
-              <a:t>fprintf</a:t>
-            </a:r>
-            <a:endParaRPr lang="en-US" dirty="0"/>
+              <a:rPr lang="en-US" dirty="0"/>
+              <a:t>following a dangling pointer</a:t>
+            </a:r>
           </a:p>
           <a:p>
             <a:pPr lvl="1"/>
             <a:r>
               <a:rPr lang="en-US" dirty="0"/>
-              <a:t>file equivalent of </a:t>
-            </a:r>
-            <a:r>
-              <a:rPr lang="en-US" dirty="0" err="1"/>
-              <a:t>printf</a:t>
-            </a:r>
-            <a:endParaRPr lang="en-US" dirty="0"/>
-          </a:p>
-          <a:p>
-            <a:pPr lvl="1"/>
-            <a:r>
-              <a:rPr lang="en-US" dirty="0" err="1"/>
-              <a:t>fprintf</a:t>
-            </a:r>
-            <a:r>
-              <a:rPr lang="en-US" dirty="0"/>
-              <a:t>(</a:t>
-            </a:r>
-            <a:r>
-              <a:rPr lang="en-US" dirty="0" err="1"/>
-              <a:t>outp</a:t>
-            </a:r>
-            <a:r>
-              <a:rPr lang="en-US" dirty="0"/>
-              <a:t>, “%.2f\n”, item);</a:t>
-            </a:r>
-          </a:p>
-          <a:p>
-            <a:r>
-              <a:rPr lang="en-US" dirty="0"/>
-              <a:t>closing a file when done</a:t>
-            </a:r>
-          </a:p>
-          <a:p>
-            <a:pPr lvl="1"/>
-            <a:r>
-              <a:rPr lang="en-US" dirty="0" err="1"/>
-              <a:t>fclose</a:t>
-            </a:r>
-            <a:r>
-              <a:rPr lang="en-US" dirty="0"/>
-              <a:t>(</a:t>
-            </a:r>
-            <a:r>
-              <a:rPr lang="en-US" dirty="0" err="1"/>
-              <a:t>inp</a:t>
-            </a:r>
-            <a:r>
-              <a:rPr lang="en-US" dirty="0"/>
-              <a:t>);</a:t>
-            </a:r>
-          </a:p>
-          <a:p>
-            <a:pPr lvl="1"/>
-            <a:r>
-              <a:rPr lang="en-US" dirty="0" err="1"/>
-              <a:t>fclose</a:t>
-            </a:r>
-            <a:r>
-              <a:rPr lang="en-US" dirty="0"/>
-              <a:t>(</a:t>
-            </a:r>
-            <a:r>
-              <a:rPr lang="en-US" dirty="0" err="1"/>
-              <a:t>outp</a:t>
-            </a:r>
-            <a:r>
-              <a:rPr lang="en-US" dirty="0"/>
-              <a:t>);</a:t>
-            </a:r>
-          </a:p>
-        </p:txBody>
-      </p:sp>
-      <p:sp>
-        <p:nvSpPr>
-          <p:cNvPr id="4" name="Footer Placeholder 3"/>
+              <a:t>accessing data beyond array bounds</a:t>
+            </a:r>
+          </a:p>
+        </p:txBody>
+      </p:sp>
+      <p:sp>
+        <p:nvSpPr>
+          <p:cNvPr id="4" name="Footer Placeholder 3">
+            <a:extLst>
+              <a:ext uri="{FF2B5EF4-FFF2-40B4-BE49-F238E27FC236}">
+                <a16:creationId xmlns:a16="http://schemas.microsoft.com/office/drawing/2014/main" id="{CA7D507E-F3B8-F740-AF1C-62CB154D17B0}"/>
+              </a:ext>
+            </a:extLst>
+          </p:cNvPr>
           <p:cNvSpPr>
             <a:spLocks noGrp="1"/>
           </p:cNvSpPr>
@@ -4100,7 +4070,13 @@
       </p:sp>
       <p:sp>
         <p:nvSpPr>
-          <p:cNvPr id="5" name="Slide Number Placeholder 4"/>
+          <p:cNvPr id="5" name="Slide Number Placeholder 4">
+            <a:extLst>
+              <a:ext uri="{FF2B5EF4-FFF2-40B4-BE49-F238E27FC236}">
+                <a16:creationId xmlns:a16="http://schemas.microsoft.com/office/drawing/2014/main" id="{2D4FFA91-7AFA-B241-9ED3-EE529142F691}"/>
+              </a:ext>
+            </a:extLst>
+          </p:cNvPr>
           <p:cNvSpPr>
             <a:spLocks noGrp="1"/>
           </p:cNvSpPr>
@@ -4124,7 +4100,7 @@
     </p:spTree>
     <p:extLst>
       <p:ext uri="{BB962C8B-B14F-4D97-AF65-F5344CB8AC3E}">
-        <p14:creationId xmlns:p14="http://schemas.microsoft.com/office/powerpoint/2010/main" val="2063610620"/>
+        <p14:creationId xmlns:p14="http://schemas.microsoft.com/office/powerpoint/2010/main" val="4202146562"/>
       </p:ext>
     </p:extLst>
   </p:cSld>
@@ -4297,10 +4273,62 @@
           </a:p>
         </p:txBody>
       </p:sp>
+      <p:sp>
+        <p:nvSpPr>
+          <p:cNvPr id="6" name="TextBox 5">
+            <a:extLst>
+              <a:ext uri="{FF2B5EF4-FFF2-40B4-BE49-F238E27FC236}">
+                <a16:creationId xmlns:a16="http://schemas.microsoft.com/office/drawing/2014/main" id="{D3FA09C1-95C3-A644-85D0-DD85E18F415D}"/>
+              </a:ext>
+            </a:extLst>
+          </p:cNvPr>
+          <p:cNvSpPr txBox="1"/>
+          <p:nvPr/>
+        </p:nvSpPr>
+        <p:spPr>
+          <a:xfrm>
+            <a:off x="457200" y="5715000"/>
+            <a:ext cx="7632539" cy="584775"/>
+          </a:xfrm>
+          <a:prstGeom prst="rect">
+            <a:avLst/>
+          </a:prstGeom>
+          <a:noFill/>
+        </p:spPr>
+        <p:txBody>
+          <a:bodyPr wrap="none" rtlCol="0">
+            <a:spAutoFit/>
+          </a:bodyPr>
+          <a:lstStyle/>
+          <a:p>
+            <a:r>
+              <a:rPr lang="en-US" sz="3200" dirty="0">
+                <a:solidFill>
+                  <a:srgbClr val="C00000"/>
+                </a:solidFill>
+              </a:rPr>
+              <a:t>let’s introduce a segmentation fault in </a:t>
+            </a:r>
+            <a:r>
+              <a:rPr lang="en-US" sz="3200" dirty="0" err="1">
+                <a:solidFill>
+                  <a:srgbClr val="C00000"/>
+                </a:solidFill>
+              </a:rPr>
+              <a:t>read.c</a:t>
+            </a:r>
+            <a:endParaRPr lang="en-US" sz="3200" dirty="0">
+              <a:solidFill>
+                <a:srgbClr val="C00000"/>
+              </a:solidFill>
+            </a:endParaRPr>
+          </a:p>
+        </p:txBody>
+      </p:sp>
     </p:spTree>
     <p:extLst>
       <p:ext uri="{BB962C8B-B14F-4D97-AF65-F5344CB8AC3E}">
-        <p14:creationId xmlns:p14="http://schemas.microsoft.com/office/powerpoint/2010/main" val="4202146562"/>
+        <p14:creationId xmlns:p14="http://schemas.microsoft.com/office/powerpoint/2010/main" val="3066002706"/>
       </p:ext>
     </p:extLst>
   </p:cSld>
@@ -4332,7 +4360,7 @@
           <p:cNvPr id="2" name="Title 1">
             <a:extLst>
               <a:ext uri="{FF2B5EF4-FFF2-40B4-BE49-F238E27FC236}">
-                <a16:creationId xmlns:a16="http://schemas.microsoft.com/office/drawing/2014/main" id="{E76389D1-2CC6-A240-8D8A-81D6153E0ACB}"/>
+                <a16:creationId xmlns:a16="http://schemas.microsoft.com/office/drawing/2014/main" id="{8003FB53-9BBB-0C47-8231-3ACCBFB61EC8}"/>
               </a:ext>
             </a:extLst>
           </p:cNvPr>
@@ -4350,7 +4378,7 @@
           <a:p>
             <a:r>
               <a:rPr lang="en-US" dirty="0"/>
-              <a:t>Segmentation fault</a:t>
+              <a:t>The NULL pointer</a:t>
             </a:r>
           </a:p>
         </p:txBody>
@@ -4360,7 +4388,7 @@
           <p:cNvPr id="3" name="Content Placeholder 2">
             <a:extLst>
               <a:ext uri="{FF2B5EF4-FFF2-40B4-BE49-F238E27FC236}">
-                <a16:creationId xmlns:a16="http://schemas.microsoft.com/office/drawing/2014/main" id="{2C9F0F02-7F11-1B46-9910-9EDC3E0EB4AB}"/>
+                <a16:creationId xmlns:a16="http://schemas.microsoft.com/office/drawing/2014/main" id="{8A7B67B0-9BB7-9E42-9A83-B02AC2069DB8}"/>
               </a:ext>
             </a:extLst>
           </p:cNvPr>
@@ -4371,48 +4399,169 @@
             <p:ph idx="1"/>
           </p:nvPr>
         </p:nvSpPr>
-        <p:spPr/>
-        <p:txBody>
-          <a:bodyPr/>
-          <a:lstStyle/>
-          <a:p>
-            <a:r>
-              <a:rPr lang="en-US" dirty="0"/>
-              <a:t>Runtime error</a:t>
-            </a:r>
-          </a:p>
-          <a:p>
-            <a:r>
-              <a:rPr lang="en-US" dirty="0"/>
-              <a:t>Means you tried to access memory that you weren’t allowed to access</a:t>
-            </a:r>
-          </a:p>
-          <a:p>
-            <a:r>
-              <a:rPr lang="en-US" dirty="0"/>
-              <a:t>Examples of causes:</a:t>
-            </a:r>
-          </a:p>
-          <a:p>
-            <a:pPr lvl="1"/>
-            <a:r>
-              <a:rPr lang="en-US" dirty="0"/>
-              <a:t>trying to read from a file that wasn’t open</a:t>
-            </a:r>
-          </a:p>
-          <a:p>
-            <a:pPr lvl="1"/>
-            <a:r>
-              <a:rPr lang="en-US" dirty="0"/>
-              <a:t>following a dangling pointer</a:t>
-            </a:r>
-          </a:p>
-          <a:p>
-            <a:pPr lvl="1"/>
-            <a:r>
-              <a:rPr lang="en-US" dirty="0"/>
-              <a:t>accessing data beyond array bounds</a:t>
-            </a:r>
+        <p:spPr>
+          <a:xfrm>
+            <a:off x="457200" y="1600200"/>
+            <a:ext cx="8229600" cy="4680175"/>
+          </a:xfrm>
+        </p:spPr>
+        <p:txBody>
+          <a:bodyPr>
+            <a:normAutofit fontScale="92500" lnSpcReduction="10000"/>
+          </a:bodyPr>
+          <a:lstStyle/>
+          <a:p>
+            <a:r>
+              <a:rPr lang="en-US" dirty="0"/>
+              <a:t>Uninitialized pointers point somewhere</a:t>
+            </a:r>
+          </a:p>
+          <a:p>
+            <a:r>
+              <a:rPr lang="en-US" dirty="0"/>
+              <a:t>NULL is a pointer that points nowhere</a:t>
+            </a:r>
+          </a:p>
+          <a:p>
+            <a:r>
+              <a:rPr lang="en-US" dirty="0"/>
+              <a:t>0 also works for </a:t>
+            </a:r>
+            <a:r>
+              <a:rPr lang="en-US"/>
+              <a:t>the null pointer</a:t>
+            </a:r>
+            <a:endParaRPr lang="en-US" dirty="0"/>
+          </a:p>
+          <a:p>
+            <a:endParaRPr lang="en-US" dirty="0"/>
+          </a:p>
+          <a:p>
+            <a:pPr marL="0" indent="0">
+              <a:buNone/>
+            </a:pPr>
+            <a:r>
+              <a:rPr lang="en-US" dirty="0">
+                <a:solidFill>
+                  <a:schemeClr val="accent4"/>
+                </a:solidFill>
+                <a:latin typeface="Calibri" panose="020F0502020204030204" pitchFamily="34" charset="0"/>
+              </a:rPr>
+              <a:t>int* </a:t>
+            </a:r>
+            <a:r>
+              <a:rPr lang="en-US" dirty="0" err="1">
+                <a:solidFill>
+                  <a:schemeClr val="accent4"/>
+                </a:solidFill>
+                <a:latin typeface="Calibri" panose="020F0502020204030204" pitchFamily="34" charset="0"/>
+              </a:rPr>
+              <a:t>ptr</a:t>
+            </a:r>
+            <a:r>
+              <a:rPr lang="en-US" dirty="0">
+                <a:solidFill>
+                  <a:schemeClr val="accent4"/>
+                </a:solidFill>
+                <a:latin typeface="Calibri" panose="020F0502020204030204" pitchFamily="34" charset="0"/>
+              </a:rPr>
+              <a:t> = NULL;</a:t>
+            </a:r>
+          </a:p>
+          <a:p>
+            <a:pPr marL="0" indent="0">
+              <a:buNone/>
+            </a:pPr>
+            <a:endParaRPr lang="en-US" dirty="0">
+              <a:solidFill>
+                <a:schemeClr val="accent4"/>
+              </a:solidFill>
+              <a:latin typeface="Calibri" panose="020F0502020204030204" pitchFamily="34" charset="0"/>
+            </a:endParaRPr>
+          </a:p>
+          <a:p>
+            <a:pPr marL="0" indent="0">
+              <a:buNone/>
+            </a:pPr>
+            <a:r>
+              <a:rPr lang="en-US" b="0" i="0" u="none" strike="noStrike" dirty="0">
+                <a:solidFill>
+                  <a:schemeClr val="accent4"/>
+                </a:solidFill>
+                <a:effectLst/>
+                <a:latin typeface="Calibri" panose="020F0502020204030204" pitchFamily="34" charset="0"/>
+              </a:rPr>
+              <a:t>if</a:t>
+            </a:r>
+            <a:r>
+              <a:rPr lang="en-US" dirty="0">
+                <a:solidFill>
+                  <a:schemeClr val="accent4"/>
+                </a:solidFill>
+                <a:latin typeface="Calibri" panose="020F0502020204030204" pitchFamily="34" charset="0"/>
+              </a:rPr>
+              <a:t> (</a:t>
+            </a:r>
+            <a:r>
+              <a:rPr lang="en-US" dirty="0" err="1">
+                <a:solidFill>
+                  <a:schemeClr val="accent4"/>
+                </a:solidFill>
+                <a:latin typeface="Calibri" panose="020F0502020204030204" pitchFamily="34" charset="0"/>
+              </a:rPr>
+              <a:t>myptr</a:t>
+            </a:r>
+            <a:r>
+              <a:rPr lang="en-US" dirty="0">
+                <a:solidFill>
+                  <a:schemeClr val="accent4"/>
+                </a:solidFill>
+                <a:latin typeface="Calibri" panose="020F0502020204030204" pitchFamily="34" charset="0"/>
+              </a:rPr>
+              <a:t> == NULL) {</a:t>
+            </a:r>
+          </a:p>
+          <a:p>
+            <a:pPr marL="0" indent="0">
+              <a:buNone/>
+            </a:pPr>
+            <a:r>
+              <a:rPr lang="en-US" b="0" i="0" u="none" strike="noStrike" dirty="0">
+                <a:solidFill>
+                  <a:schemeClr val="accent4"/>
+                </a:solidFill>
+                <a:effectLst/>
+                <a:latin typeface="Calibri" panose="020F0502020204030204" pitchFamily="34" charset="0"/>
+              </a:rPr>
+              <a:t>	…</a:t>
+            </a:r>
+          </a:p>
+          <a:p>
+            <a:pPr marL="0" indent="0">
+              <a:buNone/>
+            </a:pPr>
+            <a:r>
+              <a:rPr lang="en-US" dirty="0">
+                <a:solidFill>
+                  <a:schemeClr val="accent4"/>
+                </a:solidFill>
+                <a:latin typeface="Calibri" panose="020F0502020204030204" pitchFamily="34" charset="0"/>
+              </a:rPr>
+              <a:t>	…</a:t>
+            </a:r>
+            <a:endParaRPr lang="en-US" b="0" i="0" u="none" strike="noStrike" dirty="0">
+              <a:solidFill>
+                <a:schemeClr val="accent4"/>
+              </a:solidFill>
+              <a:effectLst/>
+              <a:latin typeface="Calibri" panose="020F0502020204030204" pitchFamily="34" charset="0"/>
+            </a:endParaRPr>
+          </a:p>
+          <a:p>
+            <a:pPr marL="0" indent="0">
+              <a:buNone/>
+            </a:pPr>
+            <a:endParaRPr lang="en-US" dirty="0"/>
           </a:p>
         </p:txBody>
       </p:sp>
@@ -4421,7 +4570,7 @@
           <p:cNvPr id="4" name="Footer Placeholder 3">
             <a:extLst>
               <a:ext uri="{FF2B5EF4-FFF2-40B4-BE49-F238E27FC236}">
-                <a16:creationId xmlns:a16="http://schemas.microsoft.com/office/drawing/2014/main" id="{CA7D507E-F3B8-F740-AF1C-62CB154D17B0}"/>
+                <a16:creationId xmlns:a16="http://schemas.microsoft.com/office/drawing/2014/main" id="{B1C8A042-84B0-9A4A-9999-6200662F7749}"/>
               </a:ext>
             </a:extLst>
           </p:cNvPr>
@@ -4449,7 +4598,7 @@
           <p:cNvPr id="5" name="Slide Number Placeholder 4">
             <a:extLst>
               <a:ext uri="{FF2B5EF4-FFF2-40B4-BE49-F238E27FC236}">
-                <a16:creationId xmlns:a16="http://schemas.microsoft.com/office/drawing/2014/main" id="{2D4FFA91-7AFA-B241-9ED3-EE529142F691}"/>
+                <a16:creationId xmlns:a16="http://schemas.microsoft.com/office/drawing/2014/main" id="{CC4804B0-E24D-1249-B5B3-39D5E90F6A89}"/>
               </a:ext>
             </a:extLst>
           </p:cNvPr>
@@ -4473,62 +4622,10 @@
           </a:p>
         </p:txBody>
       </p:sp>
-      <p:sp>
-        <p:nvSpPr>
-          <p:cNvPr id="6" name="TextBox 5">
-            <a:extLst>
-              <a:ext uri="{FF2B5EF4-FFF2-40B4-BE49-F238E27FC236}">
-                <a16:creationId xmlns:a16="http://schemas.microsoft.com/office/drawing/2014/main" id="{D3FA09C1-95C3-A644-85D0-DD85E18F415D}"/>
-              </a:ext>
-            </a:extLst>
-          </p:cNvPr>
-          <p:cNvSpPr txBox="1"/>
-          <p:nvPr/>
-        </p:nvSpPr>
-        <p:spPr>
-          <a:xfrm>
-            <a:off x="457200" y="5715000"/>
-            <a:ext cx="7632539" cy="584775"/>
-          </a:xfrm>
-          <a:prstGeom prst="rect">
-            <a:avLst/>
-          </a:prstGeom>
-          <a:noFill/>
-        </p:spPr>
-        <p:txBody>
-          <a:bodyPr wrap="none" rtlCol="0">
-            <a:spAutoFit/>
-          </a:bodyPr>
-          <a:lstStyle/>
-          <a:p>
-            <a:r>
-              <a:rPr lang="en-US" sz="3200" dirty="0">
-                <a:solidFill>
-                  <a:srgbClr val="C00000"/>
-                </a:solidFill>
-              </a:rPr>
-              <a:t>let’s introduce a segmentation fault in </a:t>
-            </a:r>
-            <a:r>
-              <a:rPr lang="en-US" sz="3200" dirty="0" err="1">
-                <a:solidFill>
-                  <a:srgbClr val="C00000"/>
-                </a:solidFill>
-              </a:rPr>
-              <a:t>read.c</a:t>
-            </a:r>
-            <a:endParaRPr lang="en-US" sz="3200" dirty="0">
-              <a:solidFill>
-                <a:srgbClr val="C00000"/>
-              </a:solidFill>
-            </a:endParaRPr>
-          </a:p>
-        </p:txBody>
-      </p:sp>
     </p:spTree>
     <p:extLst>
       <p:ext uri="{BB962C8B-B14F-4D97-AF65-F5344CB8AC3E}">
-        <p14:creationId xmlns:p14="http://schemas.microsoft.com/office/powerpoint/2010/main" val="3066002706"/>
+        <p14:creationId xmlns:p14="http://schemas.microsoft.com/office/powerpoint/2010/main" val="3456300332"/>
       </p:ext>
     </p:extLst>
   </p:cSld>
@@ -4557,13 +4654,7 @@
       </p:grpSpPr>
       <p:sp>
         <p:nvSpPr>
-          <p:cNvPr id="2" name="Title 1">
-            <a:extLst>
-              <a:ext uri="{FF2B5EF4-FFF2-40B4-BE49-F238E27FC236}">
-                <a16:creationId xmlns:a16="http://schemas.microsoft.com/office/drawing/2014/main" id="{279F6F2D-3D26-4C48-A38A-3254E82DDFAC}"/>
-              </a:ext>
-            </a:extLst>
-          </p:cNvPr>
+          <p:cNvPr id="2" name="Title 1"/>
           <p:cNvSpPr>
             <a:spLocks noGrp="1"/>
           </p:cNvSpPr>
@@ -4573,25 +4664,214 @@
         </p:nvSpPr>
         <p:spPr/>
         <p:txBody>
-          <a:bodyPr/>
-          <a:lstStyle/>
-          <a:p>
-            <a:r>
-              <a:rPr lang="en-US" dirty="0"/>
-              <a:t>Pointers</a:t>
-            </a:r>
-          </a:p>
-        </p:txBody>
-      </p:sp>
-      <p:sp>
-        <p:nvSpPr>
-          <p:cNvPr id="4" name="Footer Placeholder 3">
-            <a:extLst>
-              <a:ext uri="{FF2B5EF4-FFF2-40B4-BE49-F238E27FC236}">
-                <a16:creationId xmlns:a16="http://schemas.microsoft.com/office/drawing/2014/main" id="{F3E3D67A-78E0-1B40-A105-FE5460FEDCF5}"/>
-              </a:ext>
-            </a:extLst>
-          </p:cNvPr>
+          <a:bodyPr>
+            <a:normAutofit/>
+          </a:bodyPr>
+          <a:lstStyle/>
+          <a:p>
+            <a:r>
+              <a:rPr lang="en-US" dirty="0" err="1"/>
+              <a:t>sizeof</a:t>
+            </a:r>
+            <a:r>
+              <a:rPr lang="en-US" dirty="0"/>
+              <a:t>() function</a:t>
+            </a:r>
+          </a:p>
+        </p:txBody>
+      </p:sp>
+      <p:sp>
+        <p:nvSpPr>
+          <p:cNvPr id="3" name="Content Placeholder 2"/>
+          <p:cNvSpPr>
+            <a:spLocks noGrp="1"/>
+          </p:cNvSpPr>
+          <p:nvPr>
+            <p:ph idx="1"/>
+          </p:nvPr>
+        </p:nvSpPr>
+        <p:spPr/>
+        <p:txBody>
+          <a:bodyPr>
+            <a:normAutofit lnSpcReduction="10000"/>
+          </a:bodyPr>
+          <a:lstStyle/>
+          <a:p>
+            <a:pPr algn="l" rtl="0" fontAlgn="base">
+              <a:buFont typeface="Arial" panose="020B0604020202020204" pitchFamily="34" charset="0"/>
+              <a:buChar char="•"/>
+            </a:pPr>
+            <a:r>
+              <a:rPr lang="en-US" b="0" i="0" u="none" strike="noStrike" dirty="0">
+                <a:solidFill>
+                  <a:srgbClr val="000000"/>
+                </a:solidFill>
+                <a:effectLst/>
+                <a:latin typeface="Calibri" panose="020F0502020204030204" pitchFamily="34" charset="0"/>
+              </a:rPr>
+              <a:t>Gives the number of bytes that a variable or value takes up</a:t>
+            </a:r>
+          </a:p>
+          <a:p>
+            <a:pPr marL="0" indent="0" algn="l" rtl="0" fontAlgn="base">
+              <a:buNone/>
+            </a:pPr>
+            <a:r>
+              <a:rPr lang="en-US" dirty="0" err="1">
+                <a:solidFill>
+                  <a:schemeClr val="accent4"/>
+                </a:solidFill>
+                <a:latin typeface="Calibri" panose="020F0502020204030204" pitchFamily="34" charset="0"/>
+              </a:rPr>
+              <a:t>sizeof</a:t>
+            </a:r>
+            <a:r>
+              <a:rPr lang="en-US" dirty="0">
+                <a:solidFill>
+                  <a:schemeClr val="accent4"/>
+                </a:solidFill>
+                <a:latin typeface="Calibri" panose="020F0502020204030204" pitchFamily="34" charset="0"/>
+              </a:rPr>
+              <a:t>(m)</a:t>
+            </a:r>
+            <a:endParaRPr lang="en-US" b="0" i="0" u="none" strike="noStrike" dirty="0">
+              <a:solidFill>
+                <a:schemeClr val="accent4"/>
+              </a:solidFill>
+              <a:effectLst/>
+              <a:latin typeface="Calibri" panose="020F0502020204030204" pitchFamily="34" charset="0"/>
+            </a:endParaRPr>
+          </a:p>
+          <a:p>
+            <a:pPr algn="l" rtl="0" fontAlgn="base">
+              <a:buFont typeface="Arial" panose="020B0604020202020204" pitchFamily="34" charset="0"/>
+              <a:buChar char="•"/>
+            </a:pPr>
+            <a:r>
+              <a:rPr lang="en-US" dirty="0">
+                <a:solidFill>
+                  <a:srgbClr val="000000"/>
+                </a:solidFill>
+                <a:latin typeface="Calibri" panose="020F0502020204030204" pitchFamily="34" charset="0"/>
+              </a:rPr>
+              <a:t>On our server:</a:t>
+            </a:r>
+          </a:p>
+          <a:p>
+            <a:pPr lvl="1" fontAlgn="base">
+              <a:buFont typeface="Arial" panose="020B0604020202020204" pitchFamily="34" charset="0"/>
+              <a:buChar char="•"/>
+            </a:pPr>
+            <a:r>
+              <a:rPr lang="en-US" dirty="0">
+                <a:solidFill>
+                  <a:srgbClr val="000000"/>
+                </a:solidFill>
+                <a:latin typeface="Calibri" panose="020F0502020204030204" pitchFamily="34" charset="0"/>
+              </a:rPr>
+              <a:t>Char: 1 bytes</a:t>
+            </a:r>
+          </a:p>
+          <a:p>
+            <a:pPr lvl="1" fontAlgn="base">
+              <a:buFont typeface="Arial" panose="020B0604020202020204" pitchFamily="34" charset="0"/>
+              <a:buChar char="•"/>
+            </a:pPr>
+            <a:r>
+              <a:rPr lang="en-US" dirty="0">
+                <a:solidFill>
+                  <a:srgbClr val="000000"/>
+                </a:solidFill>
+                <a:latin typeface="Calibri" panose="020F0502020204030204" pitchFamily="34" charset="0"/>
+              </a:rPr>
+              <a:t>Int: 4 bytes</a:t>
+            </a:r>
+          </a:p>
+          <a:p>
+            <a:pPr lvl="1" fontAlgn="base">
+              <a:buFont typeface="Arial" panose="020B0604020202020204" pitchFamily="34" charset="0"/>
+              <a:buChar char="•"/>
+            </a:pPr>
+            <a:r>
+              <a:rPr lang="en-US" dirty="0">
+                <a:solidFill>
+                  <a:srgbClr val="000000"/>
+                </a:solidFill>
+                <a:latin typeface="Calibri" panose="020F0502020204030204" pitchFamily="34" charset="0"/>
+              </a:rPr>
+              <a:t>Float: 4 bytes</a:t>
+            </a:r>
+          </a:p>
+          <a:p>
+            <a:pPr lvl="1" fontAlgn="base">
+              <a:buFont typeface="Arial" panose="020B0604020202020204" pitchFamily="34" charset="0"/>
+              <a:buChar char="•"/>
+            </a:pPr>
+            <a:r>
+              <a:rPr lang="en-US" dirty="0">
+                <a:solidFill>
+                  <a:srgbClr val="000000"/>
+                </a:solidFill>
+                <a:latin typeface="Calibri" panose="020F0502020204030204" pitchFamily="34" charset="0"/>
+              </a:rPr>
+              <a:t>Double: 8 bytes</a:t>
+            </a:r>
+          </a:p>
+          <a:p>
+            <a:pPr lvl="1" fontAlgn="base">
+              <a:buFont typeface="Arial" panose="020B0604020202020204" pitchFamily="34" charset="0"/>
+              <a:buChar char="•"/>
+            </a:pPr>
+            <a:r>
+              <a:rPr lang="en-US" dirty="0">
+                <a:solidFill>
+                  <a:srgbClr val="000000"/>
+                </a:solidFill>
+                <a:latin typeface="Calibri" panose="020F0502020204030204" pitchFamily="34" charset="0"/>
+              </a:rPr>
+              <a:t>Pointer: 8 bytes</a:t>
+            </a:r>
+          </a:p>
+          <a:p>
+            <a:pPr lvl="1" fontAlgn="base">
+              <a:buFont typeface="Arial" panose="020B0604020202020204" pitchFamily="34" charset="0"/>
+              <a:buChar char="•"/>
+            </a:pPr>
+            <a:endParaRPr lang="en-US" dirty="0">
+              <a:solidFill>
+                <a:srgbClr val="7030A0"/>
+              </a:solidFill>
+            </a:endParaRPr>
+          </a:p>
+          <a:p>
+            <a:pPr marL="914400" lvl="2" indent="0">
+              <a:buNone/>
+            </a:pPr>
+            <a:endParaRPr lang="en-US" dirty="0"/>
+          </a:p>
+          <a:p>
+            <a:pPr marL="914400" lvl="2" indent="0">
+              <a:buNone/>
+            </a:pPr>
+            <a:endParaRPr lang="en-US" dirty="0"/>
+          </a:p>
+          <a:p>
+            <a:pPr marL="914400" lvl="2" indent="0">
+              <a:buNone/>
+            </a:pPr>
+            <a:endParaRPr lang="en-US" dirty="0"/>
+          </a:p>
+          <a:p>
+            <a:pPr marL="914400" lvl="2" indent="0">
+              <a:buNone/>
+            </a:pPr>
+            <a:endParaRPr lang="en-US" dirty="0"/>
+          </a:p>
+        </p:txBody>
+      </p:sp>
+      <p:sp>
+        <p:nvSpPr>
+          <p:cNvPr id="4" name="Footer Placeholder 3"/>
           <p:cNvSpPr>
             <a:spLocks noGrp="1"/>
           </p:cNvSpPr>
@@ -4613,13 +4893,7 @@
       </p:sp>
       <p:sp>
         <p:nvSpPr>
-          <p:cNvPr id="5" name="Slide Number Placeholder 4">
-            <a:extLst>
-              <a:ext uri="{FF2B5EF4-FFF2-40B4-BE49-F238E27FC236}">
-                <a16:creationId xmlns:a16="http://schemas.microsoft.com/office/drawing/2014/main" id="{356FB9C2-2726-C64F-B527-C337943C81A5}"/>
-              </a:ext>
-            </a:extLst>
-          </p:cNvPr>
+          <p:cNvPr id="5" name="Slide Number Placeholder 4"/>
           <p:cNvSpPr>
             <a:spLocks noGrp="1"/>
           </p:cNvSpPr>
@@ -4640,563 +4914,10 @@
           </a:p>
         </p:txBody>
       </p:sp>
-      <p:sp>
-        <p:nvSpPr>
-          <p:cNvPr id="13" name="Rectangle 12">
-            <a:extLst>
-              <a:ext uri="{FF2B5EF4-FFF2-40B4-BE49-F238E27FC236}">
-                <a16:creationId xmlns:a16="http://schemas.microsoft.com/office/drawing/2014/main" id="{AAB60E3E-166F-A14B-9773-FE53A099C918}"/>
-              </a:ext>
-            </a:extLst>
-          </p:cNvPr>
-          <p:cNvSpPr/>
-          <p:nvPr/>
-        </p:nvSpPr>
-        <p:spPr>
-          <a:xfrm>
-            <a:off x="6553200" y="2814854"/>
-            <a:ext cx="990600" cy="762001"/>
-          </a:xfrm>
-          <a:prstGeom prst="rect">
-            <a:avLst/>
-          </a:prstGeom>
-          <a:noFill/>
-        </p:spPr>
-        <p:style>
-          <a:lnRef idx="2">
-            <a:schemeClr val="accent1">
-              <a:shade val="50000"/>
-            </a:schemeClr>
-          </a:lnRef>
-          <a:fillRef idx="1">
-            <a:schemeClr val="accent1"/>
-          </a:fillRef>
-          <a:effectRef idx="0">
-            <a:schemeClr val="accent1"/>
-          </a:effectRef>
-          <a:fontRef idx="minor">
-            <a:schemeClr val="lt1"/>
-          </a:fontRef>
-        </p:style>
-        <p:txBody>
-          <a:bodyPr rtlCol="0" anchor="ctr"/>
-          <a:lstStyle/>
-          <a:p>
-            <a:pPr algn="ctr"/>
-            <a:endParaRPr lang="en-US"/>
-          </a:p>
-        </p:txBody>
-      </p:sp>
-      <p:sp>
-        <p:nvSpPr>
-          <p:cNvPr id="15" name="TextBox 14">
-            <a:extLst>
-              <a:ext uri="{FF2B5EF4-FFF2-40B4-BE49-F238E27FC236}">
-                <a16:creationId xmlns:a16="http://schemas.microsoft.com/office/drawing/2014/main" id="{43F7F812-B078-404E-91AB-02C945102C90}"/>
-              </a:ext>
-            </a:extLst>
-          </p:cNvPr>
-          <p:cNvSpPr txBox="1"/>
-          <p:nvPr/>
-        </p:nvSpPr>
-        <p:spPr>
-          <a:xfrm>
-            <a:off x="5650921" y="2891055"/>
-            <a:ext cx="944489" cy="707886"/>
-          </a:xfrm>
-          <a:prstGeom prst="rect">
-            <a:avLst/>
-          </a:prstGeom>
-          <a:noFill/>
-        </p:spPr>
-        <p:txBody>
-          <a:bodyPr wrap="none" rtlCol="0">
-            <a:spAutoFit/>
-          </a:bodyPr>
-          <a:lstStyle/>
-          <a:p>
-            <a:r>
-              <a:rPr lang="en-US" sz="2000" dirty="0"/>
-              <a:t>0x5100</a:t>
-            </a:r>
-          </a:p>
-          <a:p>
-            <a:r>
-              <a:rPr lang="en-US" sz="2000" dirty="0"/>
-              <a:t>0x5108</a:t>
-            </a:r>
-          </a:p>
-        </p:txBody>
-      </p:sp>
-      <p:sp>
-        <p:nvSpPr>
-          <p:cNvPr id="16" name="TextBox 15">
-            <a:extLst>
-              <a:ext uri="{FF2B5EF4-FFF2-40B4-BE49-F238E27FC236}">
-                <a16:creationId xmlns:a16="http://schemas.microsoft.com/office/drawing/2014/main" id="{E0610F32-83B8-1842-B48E-128639F82DB3}"/>
-              </a:ext>
-            </a:extLst>
-          </p:cNvPr>
-          <p:cNvSpPr txBox="1"/>
-          <p:nvPr/>
-        </p:nvSpPr>
-        <p:spPr>
-          <a:xfrm>
-            <a:off x="6869902" y="2976781"/>
-            <a:ext cx="292068" cy="369332"/>
-          </a:xfrm>
-          <a:prstGeom prst="rect">
-            <a:avLst/>
-          </a:prstGeom>
-          <a:noFill/>
-        </p:spPr>
-        <p:txBody>
-          <a:bodyPr wrap="none" lIns="91440" tIns="45720" rIns="91440" bIns="45720" rtlCol="0" anchor="t">
-            <a:spAutoFit/>
-          </a:bodyPr>
-          <a:lstStyle/>
-          <a:p>
-            <a:r>
-              <a:rPr lang="en-US" dirty="0"/>
-              <a:t>?</a:t>
-            </a:r>
-          </a:p>
-        </p:txBody>
-      </p:sp>
-      <p:sp>
-        <p:nvSpPr>
-          <p:cNvPr id="17" name="TextBox 16">
-            <a:extLst>
-              <a:ext uri="{FF2B5EF4-FFF2-40B4-BE49-F238E27FC236}">
-                <a16:creationId xmlns:a16="http://schemas.microsoft.com/office/drawing/2014/main" id="{9C0D55F0-5ABE-7E4A-AF95-FC54E9C3A923}"/>
-              </a:ext>
-            </a:extLst>
-          </p:cNvPr>
-          <p:cNvSpPr txBox="1"/>
-          <p:nvPr/>
-        </p:nvSpPr>
-        <p:spPr>
-          <a:xfrm>
-            <a:off x="7618391" y="2819320"/>
-            <a:ext cx="184731" cy="707886"/>
-          </a:xfrm>
-          <a:prstGeom prst="rect">
-            <a:avLst/>
-          </a:prstGeom>
-          <a:noFill/>
-        </p:spPr>
-        <p:txBody>
-          <a:bodyPr wrap="none" rtlCol="0">
-            <a:spAutoFit/>
-          </a:bodyPr>
-          <a:lstStyle/>
-          <a:p>
-            <a:endParaRPr lang="en-US" sz="2000" dirty="0"/>
-          </a:p>
-          <a:p>
-            <a:endParaRPr lang="en-US" sz="2000" dirty="0"/>
-          </a:p>
-        </p:txBody>
-      </p:sp>
-      <p:sp>
-        <p:nvSpPr>
-          <p:cNvPr id="18" name="TextBox 17">
-            <a:extLst>
-              <a:ext uri="{FF2B5EF4-FFF2-40B4-BE49-F238E27FC236}">
-                <a16:creationId xmlns:a16="http://schemas.microsoft.com/office/drawing/2014/main" id="{AF363031-1ABC-3845-B9C1-85B329832D1C}"/>
-              </a:ext>
-            </a:extLst>
-          </p:cNvPr>
-          <p:cNvSpPr txBox="1"/>
-          <p:nvPr/>
-        </p:nvSpPr>
-        <p:spPr>
-          <a:xfrm>
-            <a:off x="6777537" y="3218566"/>
-            <a:ext cx="184731" cy="369332"/>
-          </a:xfrm>
-          <a:prstGeom prst="rect">
-            <a:avLst/>
-          </a:prstGeom>
-          <a:noFill/>
-        </p:spPr>
-        <p:txBody>
-          <a:bodyPr wrap="none" lIns="91440" tIns="45720" rIns="91440" bIns="45720" rtlCol="0" anchor="t">
-            <a:spAutoFit/>
-          </a:bodyPr>
-          <a:lstStyle/>
-          <a:p>
-            <a:endParaRPr lang="en-US" dirty="0">
-              <a:ea typeface="Calibri"/>
-              <a:cs typeface="Calibri"/>
-            </a:endParaRPr>
-          </a:p>
-        </p:txBody>
-      </p:sp>
-      <p:sp>
-        <p:nvSpPr>
-          <p:cNvPr id="19" name="TextBox 18">
-            <a:extLst>
-              <a:ext uri="{FF2B5EF4-FFF2-40B4-BE49-F238E27FC236}">
-                <a16:creationId xmlns:a16="http://schemas.microsoft.com/office/drawing/2014/main" id="{CED84787-06DD-844A-8C5C-715C8DCECC3C}"/>
-              </a:ext>
-            </a:extLst>
-          </p:cNvPr>
-          <p:cNvSpPr txBox="1"/>
-          <p:nvPr/>
-        </p:nvSpPr>
-        <p:spPr>
-          <a:xfrm>
-            <a:off x="6897923" y="3741265"/>
-            <a:ext cx="343364" cy="369332"/>
-          </a:xfrm>
-          <a:prstGeom prst="rect">
-            <a:avLst/>
-          </a:prstGeom>
-          <a:noFill/>
-        </p:spPr>
-        <p:txBody>
-          <a:bodyPr wrap="none" rtlCol="0">
-            <a:spAutoFit/>
-          </a:bodyPr>
-          <a:lstStyle/>
-          <a:p>
-            <a:r>
-              <a:rPr lang="en-US" dirty="0"/>
-              <a:t>…</a:t>
-            </a:r>
-          </a:p>
-        </p:txBody>
-      </p:sp>
-      <p:sp>
-        <p:nvSpPr>
-          <p:cNvPr id="20" name="Rectangle 19">
-            <a:extLst>
-              <a:ext uri="{FF2B5EF4-FFF2-40B4-BE49-F238E27FC236}">
-                <a16:creationId xmlns:a16="http://schemas.microsoft.com/office/drawing/2014/main" id="{462E7ED2-7E8E-FE4A-9464-893CE8E63F30}"/>
-              </a:ext>
-            </a:extLst>
-          </p:cNvPr>
-          <p:cNvSpPr/>
-          <p:nvPr/>
-        </p:nvSpPr>
-        <p:spPr>
-          <a:xfrm>
-            <a:off x="6553200" y="4256031"/>
-            <a:ext cx="990600" cy="762001"/>
-          </a:xfrm>
-          <a:prstGeom prst="rect">
-            <a:avLst/>
-          </a:prstGeom>
-          <a:noFill/>
-        </p:spPr>
-        <p:style>
-          <a:lnRef idx="2">
-            <a:schemeClr val="accent1">
-              <a:shade val="50000"/>
-            </a:schemeClr>
-          </a:lnRef>
-          <a:fillRef idx="1">
-            <a:schemeClr val="accent1"/>
-          </a:fillRef>
-          <a:effectRef idx="0">
-            <a:schemeClr val="accent1"/>
-          </a:effectRef>
-          <a:fontRef idx="minor">
-            <a:schemeClr val="lt1"/>
-          </a:fontRef>
-        </p:style>
-        <p:txBody>
-          <a:bodyPr rtlCol="0" anchor="ctr"/>
-          <a:lstStyle/>
-          <a:p>
-            <a:pPr algn="ctr"/>
-            <a:endParaRPr lang="en-US"/>
-          </a:p>
-        </p:txBody>
-      </p:sp>
-      <p:sp>
-        <p:nvSpPr>
-          <p:cNvPr id="22" name="TextBox 21">
-            <a:extLst>
-              <a:ext uri="{FF2B5EF4-FFF2-40B4-BE49-F238E27FC236}">
-                <a16:creationId xmlns:a16="http://schemas.microsoft.com/office/drawing/2014/main" id="{6C856145-698D-6940-B8EE-80DC3A094143}"/>
-              </a:ext>
-            </a:extLst>
-          </p:cNvPr>
-          <p:cNvSpPr txBox="1"/>
-          <p:nvPr/>
-        </p:nvSpPr>
-        <p:spPr>
-          <a:xfrm>
-            <a:off x="5650921" y="4332232"/>
-            <a:ext cx="944489" cy="707886"/>
-          </a:xfrm>
-          <a:prstGeom prst="rect">
-            <a:avLst/>
-          </a:prstGeom>
-          <a:noFill/>
-        </p:spPr>
-        <p:txBody>
-          <a:bodyPr wrap="none" rtlCol="0">
-            <a:spAutoFit/>
-          </a:bodyPr>
-          <a:lstStyle/>
-          <a:p>
-            <a:r>
-              <a:rPr lang="en-US" sz="2000" dirty="0"/>
-              <a:t>0x5200</a:t>
-            </a:r>
-          </a:p>
-          <a:p>
-            <a:r>
-              <a:rPr lang="en-US" sz="2000" dirty="0"/>
-              <a:t>0x5204</a:t>
-            </a:r>
-          </a:p>
-        </p:txBody>
-      </p:sp>
-      <p:sp>
-        <p:nvSpPr>
-          <p:cNvPr id="23" name="TextBox 22">
-            <a:extLst>
-              <a:ext uri="{FF2B5EF4-FFF2-40B4-BE49-F238E27FC236}">
-                <a16:creationId xmlns:a16="http://schemas.microsoft.com/office/drawing/2014/main" id="{8B0E30E7-36F0-344B-A281-4B1EEB67788D}"/>
-              </a:ext>
-            </a:extLst>
-          </p:cNvPr>
-          <p:cNvSpPr txBox="1"/>
-          <p:nvPr/>
-        </p:nvSpPr>
-        <p:spPr>
-          <a:xfrm>
-            <a:off x="6869902" y="4409398"/>
-            <a:ext cx="292068" cy="369332"/>
-          </a:xfrm>
-          <a:prstGeom prst="rect">
-            <a:avLst/>
-          </a:prstGeom>
-          <a:noFill/>
-        </p:spPr>
-        <p:txBody>
-          <a:bodyPr wrap="none" rtlCol="0">
-            <a:spAutoFit/>
-          </a:bodyPr>
-          <a:lstStyle/>
-          <a:p>
-            <a:r>
-              <a:rPr lang="en-US" dirty="0"/>
-              <a:t>?</a:t>
-            </a:r>
-          </a:p>
-        </p:txBody>
-      </p:sp>
-      <p:sp>
-        <p:nvSpPr>
-          <p:cNvPr id="24" name="TextBox 23">
-            <a:extLst>
-              <a:ext uri="{FF2B5EF4-FFF2-40B4-BE49-F238E27FC236}">
-                <a16:creationId xmlns:a16="http://schemas.microsoft.com/office/drawing/2014/main" id="{CFB9C02E-8302-2349-A343-317EEADAA02F}"/>
-              </a:ext>
-            </a:extLst>
-          </p:cNvPr>
-          <p:cNvSpPr txBox="1"/>
-          <p:nvPr/>
-        </p:nvSpPr>
-        <p:spPr>
-          <a:xfrm>
-            <a:off x="7618391" y="4260497"/>
-            <a:ext cx="184731" cy="707886"/>
-          </a:xfrm>
-          <a:prstGeom prst="rect">
-            <a:avLst/>
-          </a:prstGeom>
-          <a:noFill/>
-        </p:spPr>
-        <p:txBody>
-          <a:bodyPr wrap="none" rtlCol="0">
-            <a:spAutoFit/>
-          </a:bodyPr>
-          <a:lstStyle/>
-          <a:p>
-            <a:endParaRPr lang="en-US" sz="2000" dirty="0"/>
-          </a:p>
-          <a:p>
-            <a:endParaRPr lang="en-US" sz="2000" dirty="0"/>
-          </a:p>
-        </p:txBody>
-      </p:sp>
-      <p:sp>
-        <p:nvSpPr>
-          <p:cNvPr id="25" name="TextBox 24">
-            <a:extLst>
-              <a:ext uri="{FF2B5EF4-FFF2-40B4-BE49-F238E27FC236}">
-                <a16:creationId xmlns:a16="http://schemas.microsoft.com/office/drawing/2014/main" id="{4058B56C-9ED3-6D4F-9770-20C89FE3D0E8}"/>
-              </a:ext>
-            </a:extLst>
-          </p:cNvPr>
-          <p:cNvSpPr txBox="1"/>
-          <p:nvPr/>
-        </p:nvSpPr>
-        <p:spPr>
-          <a:xfrm>
-            <a:off x="6897923" y="5182442"/>
-            <a:ext cx="343364" cy="369332"/>
-          </a:xfrm>
-          <a:prstGeom prst="rect">
-            <a:avLst/>
-          </a:prstGeom>
-          <a:noFill/>
-        </p:spPr>
-        <p:txBody>
-          <a:bodyPr wrap="none" rtlCol="0">
-            <a:spAutoFit/>
-          </a:bodyPr>
-          <a:lstStyle/>
-          <a:p>
-            <a:r>
-              <a:rPr lang="en-US" dirty="0"/>
-              <a:t>…</a:t>
-            </a:r>
-          </a:p>
-        </p:txBody>
-      </p:sp>
-      <p:sp>
-        <p:nvSpPr>
-          <p:cNvPr id="26" name="TextBox 25">
-            <a:extLst>
-              <a:ext uri="{FF2B5EF4-FFF2-40B4-BE49-F238E27FC236}">
-                <a16:creationId xmlns:a16="http://schemas.microsoft.com/office/drawing/2014/main" id="{70A68636-2023-8247-84C6-AA1931A1AA7A}"/>
-              </a:ext>
-            </a:extLst>
-          </p:cNvPr>
-          <p:cNvSpPr txBox="1"/>
-          <p:nvPr/>
-        </p:nvSpPr>
-        <p:spPr>
-          <a:xfrm>
-            <a:off x="728824" y="2660438"/>
-            <a:ext cx="2487925" cy="3108543"/>
-          </a:xfrm>
-          <a:prstGeom prst="rect">
-            <a:avLst/>
-          </a:prstGeom>
-          <a:noFill/>
-        </p:spPr>
-        <p:txBody>
-          <a:bodyPr wrap="none" lIns="91440" tIns="45720" rIns="91440" bIns="45720" rtlCol="0" anchor="t">
-            <a:spAutoFit/>
-          </a:bodyPr>
-          <a:lstStyle/>
-          <a:p>
-            <a:r>
-              <a:rPr lang="en-US" sz="2800" b="1" dirty="0"/>
-              <a:t>int main(void) {</a:t>
-            </a:r>
-          </a:p>
-          <a:p>
-            <a:r>
-              <a:rPr lang="en-US" sz="2800" b="1" dirty="0">
-                <a:solidFill>
-                  <a:schemeClr val="bg1">
-                    <a:lumMod val="65000"/>
-                  </a:schemeClr>
-                </a:solidFill>
-              </a:rPr>
-              <a:t>    int *b;</a:t>
-            </a:r>
-          </a:p>
-          <a:p>
-            <a:r>
-              <a:rPr lang="en-US" sz="2800" b="1" dirty="0">
-                <a:solidFill>
-                  <a:schemeClr val="bg1">
-                    <a:lumMod val="65000"/>
-                  </a:schemeClr>
-                </a:solidFill>
-              </a:rPr>
-              <a:t>    int n;</a:t>
-            </a:r>
-          </a:p>
-          <a:p>
-            <a:r>
-              <a:rPr lang="en-US" sz="2800" b="1" dirty="0">
-                <a:solidFill>
-                  <a:schemeClr val="bg1">
-                    <a:lumMod val="65000"/>
-                  </a:schemeClr>
-                </a:solidFill>
-              </a:rPr>
-              <a:t>    n = 5;</a:t>
-            </a:r>
-          </a:p>
-          <a:p>
-            <a:r>
-              <a:rPr lang="en-US" sz="2800" b="1" dirty="0">
-                <a:solidFill>
-                  <a:schemeClr val="bg1">
-                    <a:lumMod val="65000"/>
-                  </a:schemeClr>
-                </a:solidFill>
-              </a:rPr>
-              <a:t>    b = &amp;n;</a:t>
-            </a:r>
-            <a:endParaRPr lang="en-US" sz="2800" b="1" dirty="0">
-              <a:solidFill>
-                <a:schemeClr val="bg1">
-                  <a:lumMod val="65000"/>
-                </a:schemeClr>
-              </a:solidFill>
-              <a:cs typeface="Calibri"/>
-            </a:endParaRPr>
-          </a:p>
-          <a:p>
-            <a:endParaRPr lang="en-US" sz="2800" b="1" dirty="0"/>
-          </a:p>
-          <a:p>
-            <a:endParaRPr lang="en-US" sz="2800" b="1" dirty="0"/>
-          </a:p>
-        </p:txBody>
-      </p:sp>
-      <p:sp>
-        <p:nvSpPr>
-          <p:cNvPr id="27" name="Content Placeholder 2">
-            <a:extLst>
-              <a:ext uri="{FF2B5EF4-FFF2-40B4-BE49-F238E27FC236}">
-                <a16:creationId xmlns:a16="http://schemas.microsoft.com/office/drawing/2014/main" id="{A56E8ABD-81EE-6E45-A9C1-8BCD10B19708}"/>
-              </a:ext>
-            </a:extLst>
-          </p:cNvPr>
-          <p:cNvSpPr>
-            <a:spLocks noGrp="1"/>
-          </p:cNvSpPr>
-          <p:nvPr>
-            <p:ph idx="1"/>
-          </p:nvPr>
-        </p:nvSpPr>
-        <p:spPr>
-          <a:xfrm>
-            <a:off x="457200" y="1600201"/>
-            <a:ext cx="8229600" cy="1040250"/>
-          </a:xfrm>
-        </p:spPr>
-        <p:txBody>
-          <a:bodyPr>
-            <a:normAutofit/>
-          </a:bodyPr>
-          <a:lstStyle/>
-          <a:p>
-            <a:r>
-              <a:rPr lang="en-US" dirty="0"/>
-              <a:t>Create an integer pointer variable and set it</a:t>
-            </a:r>
-          </a:p>
-        </p:txBody>
-      </p:sp>
     </p:spTree>
     <p:extLst>
       <p:ext uri="{BB962C8B-B14F-4D97-AF65-F5344CB8AC3E}">
-        <p14:creationId xmlns:p14="http://schemas.microsoft.com/office/powerpoint/2010/main" val="3094051308"/>
+        <p14:creationId xmlns:p14="http://schemas.microsoft.com/office/powerpoint/2010/main" val="996278040"/>
       </p:ext>
     </p:extLst>
   </p:cSld>
@@ -5398,6 +5119,41 @@
       </p:sp>
       <p:sp>
         <p:nvSpPr>
+          <p:cNvPr id="16" name="TextBox 15">
+            <a:extLst>
+              <a:ext uri="{FF2B5EF4-FFF2-40B4-BE49-F238E27FC236}">
+                <a16:creationId xmlns:a16="http://schemas.microsoft.com/office/drawing/2014/main" id="{E0610F32-83B8-1842-B48E-128639F82DB3}"/>
+              </a:ext>
+            </a:extLst>
+          </p:cNvPr>
+          <p:cNvSpPr txBox="1"/>
+          <p:nvPr/>
+        </p:nvSpPr>
+        <p:spPr>
+          <a:xfrm>
+            <a:off x="6869902" y="2976781"/>
+            <a:ext cx="292068" cy="369332"/>
+          </a:xfrm>
+          <a:prstGeom prst="rect">
+            <a:avLst/>
+          </a:prstGeom>
+          <a:noFill/>
+        </p:spPr>
+        <p:txBody>
+          <a:bodyPr wrap="none" lIns="91440" tIns="45720" rIns="91440" bIns="45720" rtlCol="0" anchor="t">
+            <a:spAutoFit/>
+          </a:bodyPr>
+          <a:lstStyle/>
+          <a:p>
+            <a:r>
+              <a:rPr lang="en-US" dirty="0"/>
+              <a:t>?</a:t>
+            </a:r>
+          </a:p>
+        </p:txBody>
+      </p:sp>
+      <p:sp>
+        <p:nvSpPr>
           <p:cNvPr id="17" name="TextBox 16">
             <a:extLst>
               <a:ext uri="{FF2B5EF4-FFF2-40B4-BE49-F238E27FC236}">
@@ -5591,10 +5347,10 @@
       </p:sp>
       <p:sp>
         <p:nvSpPr>
-          <p:cNvPr id="24" name="TextBox 23">
-            <a:extLst>
-              <a:ext uri="{FF2B5EF4-FFF2-40B4-BE49-F238E27FC236}">
-                <a16:creationId xmlns:a16="http://schemas.microsoft.com/office/drawing/2014/main" id="{CFB9C02E-8302-2349-A343-317EEADAA02F}"/>
+          <p:cNvPr id="23" name="TextBox 22">
+            <a:extLst>
+              <a:ext uri="{FF2B5EF4-FFF2-40B4-BE49-F238E27FC236}">
+                <a16:creationId xmlns:a16="http://schemas.microsoft.com/office/drawing/2014/main" id="{8B0E30E7-36F0-344B-A281-4B1EEB67788D}"/>
               </a:ext>
             </a:extLst>
           </p:cNvPr>
@@ -5603,8 +5359,8 @@
         </p:nvSpPr>
         <p:spPr>
           <a:xfrm>
-            <a:off x="7618391" y="4260497"/>
-            <a:ext cx="184731" cy="707886"/>
+            <a:off x="6869902" y="4409398"/>
+            <a:ext cx="292068" cy="369332"/>
           </a:xfrm>
           <a:prstGeom prst="rect">
             <a:avLst/>
@@ -5617,19 +5373,19 @@
           </a:bodyPr>
           <a:lstStyle/>
           <a:p>
-            <a:endParaRPr lang="en-US" sz="2000" dirty="0"/>
-          </a:p>
-          <a:p>
-            <a:endParaRPr lang="en-US" sz="2000" dirty="0"/>
-          </a:p>
-        </p:txBody>
-      </p:sp>
-      <p:sp>
-        <p:nvSpPr>
-          <p:cNvPr id="25" name="TextBox 24">
-            <a:extLst>
-              <a:ext uri="{FF2B5EF4-FFF2-40B4-BE49-F238E27FC236}">
-                <a16:creationId xmlns:a16="http://schemas.microsoft.com/office/drawing/2014/main" id="{4058B56C-9ED3-6D4F-9770-20C89FE3D0E8}"/>
+            <a:r>
+              <a:rPr lang="en-US" dirty="0"/>
+              <a:t>?</a:t>
+            </a:r>
+          </a:p>
+        </p:txBody>
+      </p:sp>
+      <p:sp>
+        <p:nvSpPr>
+          <p:cNvPr id="24" name="TextBox 23">
+            <a:extLst>
+              <a:ext uri="{FF2B5EF4-FFF2-40B4-BE49-F238E27FC236}">
+                <a16:creationId xmlns:a16="http://schemas.microsoft.com/office/drawing/2014/main" id="{CFB9C02E-8302-2349-A343-317EEADAA02F}"/>
               </a:ext>
             </a:extLst>
           </p:cNvPr>
@@ -5638,8 +5394,8 @@
         </p:nvSpPr>
         <p:spPr>
           <a:xfrm>
-            <a:off x="6897923" y="5182442"/>
-            <a:ext cx="343364" cy="369332"/>
+            <a:off x="7618391" y="4260497"/>
+            <a:ext cx="184731" cy="707886"/>
           </a:xfrm>
           <a:prstGeom prst="rect">
             <a:avLst/>
@@ -5652,6 +5408,41 @@
           </a:bodyPr>
           <a:lstStyle/>
           <a:p>
+            <a:endParaRPr lang="en-US" sz="2000" dirty="0"/>
+          </a:p>
+          <a:p>
+            <a:endParaRPr lang="en-US" sz="2000" dirty="0"/>
+          </a:p>
+        </p:txBody>
+      </p:sp>
+      <p:sp>
+        <p:nvSpPr>
+          <p:cNvPr id="25" name="TextBox 24">
+            <a:extLst>
+              <a:ext uri="{FF2B5EF4-FFF2-40B4-BE49-F238E27FC236}">
+                <a16:creationId xmlns:a16="http://schemas.microsoft.com/office/drawing/2014/main" id="{4058B56C-9ED3-6D4F-9770-20C89FE3D0E8}"/>
+              </a:ext>
+            </a:extLst>
+          </p:cNvPr>
+          <p:cNvSpPr txBox="1"/>
+          <p:nvPr/>
+        </p:nvSpPr>
+        <p:spPr>
+          <a:xfrm>
+            <a:off x="6897923" y="5182442"/>
+            <a:ext cx="343364" cy="369332"/>
+          </a:xfrm>
+          <a:prstGeom prst="rect">
+            <a:avLst/>
+          </a:prstGeom>
+          <a:noFill/>
+        </p:spPr>
+        <p:txBody>
+          <a:bodyPr wrap="none" rtlCol="0">
+            <a:spAutoFit/>
+          </a:bodyPr>
+          <a:lstStyle/>
+          <a:p>
             <a:r>
               <a:rPr lang="en-US" dirty="0"/>
               <a:t>…</a:t>
@@ -5694,7 +5485,13 @@
           </a:p>
           <a:p>
             <a:r>
-              <a:rPr lang="en-US" sz="2800" b="1" dirty="0"/>
+              <a:rPr lang="en-US" sz="2800" b="1" dirty="0">
+                <a:solidFill>
+                  <a:schemeClr val="bg1">
+                    <a:lumMod val="65000"/>
+                  </a:schemeClr>
+                </a:solidFill>
+              </a:rPr>
               <a:t>    int *b;</a:t>
             </a:r>
           </a:p>
@@ -5785,115 +5582,10 @@
           </a:p>
         </p:txBody>
       </p:sp>
-      <p:sp>
-        <p:nvSpPr>
-          <p:cNvPr id="30" name="TextBox 29">
-            <a:extLst>
-              <a:ext uri="{FF2B5EF4-FFF2-40B4-BE49-F238E27FC236}">
-                <a16:creationId xmlns:a16="http://schemas.microsoft.com/office/drawing/2014/main" id="{C4A82183-8CC5-A84F-85E4-EC754E09E902}"/>
-              </a:ext>
-            </a:extLst>
-          </p:cNvPr>
-          <p:cNvSpPr txBox="1"/>
-          <p:nvPr/>
-        </p:nvSpPr>
-        <p:spPr>
-          <a:xfrm>
-            <a:off x="7724466" y="2778363"/>
-            <a:ext cx="306494" cy="369332"/>
-          </a:xfrm>
-          <a:prstGeom prst="rect">
-            <a:avLst/>
-          </a:prstGeom>
-          <a:noFill/>
-        </p:spPr>
-        <p:txBody>
-          <a:bodyPr wrap="none" rtlCol="0">
-            <a:spAutoFit/>
-          </a:bodyPr>
-          <a:lstStyle/>
-          <a:p>
-            <a:r>
-              <a:rPr lang="en-US" dirty="0"/>
-              <a:t>b</a:t>
-            </a:r>
-          </a:p>
-        </p:txBody>
-      </p:sp>
-      <p:sp>
-        <p:nvSpPr>
-          <p:cNvPr id="32" name="TextBox 31">
-            <a:extLst>
-              <a:ext uri="{FF2B5EF4-FFF2-40B4-BE49-F238E27FC236}">
-                <a16:creationId xmlns:a16="http://schemas.microsoft.com/office/drawing/2014/main" id="{2AA714EC-0794-F54D-86C5-240D8D24E9FB}"/>
-              </a:ext>
-            </a:extLst>
-          </p:cNvPr>
-          <p:cNvSpPr txBox="1"/>
-          <p:nvPr/>
-        </p:nvSpPr>
-        <p:spPr>
-          <a:xfrm>
-            <a:off x="6869902" y="2976781"/>
-            <a:ext cx="292068" cy="369332"/>
-          </a:xfrm>
-          <a:prstGeom prst="rect">
-            <a:avLst/>
-          </a:prstGeom>
-          <a:noFill/>
-        </p:spPr>
-        <p:txBody>
-          <a:bodyPr wrap="none" lIns="91440" tIns="45720" rIns="91440" bIns="45720" rtlCol="0" anchor="t">
-            <a:spAutoFit/>
-          </a:bodyPr>
-          <a:lstStyle/>
-          <a:p>
-            <a:r>
-              <a:rPr lang="en-US" dirty="0"/>
-              <a:t>?</a:t>
-            </a:r>
-          </a:p>
-        </p:txBody>
-      </p:sp>
-      <p:sp>
-        <p:nvSpPr>
-          <p:cNvPr id="33" name="TextBox 32">
-            <a:extLst>
-              <a:ext uri="{FF2B5EF4-FFF2-40B4-BE49-F238E27FC236}">
-                <a16:creationId xmlns:a16="http://schemas.microsoft.com/office/drawing/2014/main" id="{480F5C0E-2F00-F841-9E07-5014DB9A4418}"/>
-              </a:ext>
-            </a:extLst>
-          </p:cNvPr>
-          <p:cNvSpPr txBox="1"/>
-          <p:nvPr/>
-        </p:nvSpPr>
-        <p:spPr>
-          <a:xfrm>
-            <a:off x="6869902" y="4409398"/>
-            <a:ext cx="292068" cy="369332"/>
-          </a:xfrm>
-          <a:prstGeom prst="rect">
-            <a:avLst/>
-          </a:prstGeom>
-          <a:noFill/>
-        </p:spPr>
-        <p:txBody>
-          <a:bodyPr wrap="none" rtlCol="0">
-            <a:spAutoFit/>
-          </a:bodyPr>
-          <a:lstStyle/>
-          <a:p>
-            <a:r>
-              <a:rPr lang="en-US" dirty="0"/>
-              <a:t>?</a:t>
-            </a:r>
-          </a:p>
-        </p:txBody>
-      </p:sp>
     </p:spTree>
     <p:extLst>
       <p:ext uri="{BB962C8B-B14F-4D97-AF65-F5344CB8AC3E}">
-        <p14:creationId xmlns:p14="http://schemas.microsoft.com/office/powerpoint/2010/main" val="3347865859"/>
+        <p14:creationId xmlns:p14="http://schemas.microsoft.com/office/powerpoint/2010/main" val="3094051308"/>
       </p:ext>
     </p:extLst>
   </p:cSld>
@@ -6116,7 +5808,7 @@
           <a:noFill/>
         </p:spPr>
         <p:txBody>
-          <a:bodyPr wrap="square" rtlCol="0">
+          <a:bodyPr wrap="none" rtlCol="0">
             <a:spAutoFit/>
           </a:bodyPr>
           <a:lstStyle/>
@@ -6397,7 +6089,13 @@
           </a:p>
           <a:p>
             <a:r>
-              <a:rPr lang="en-US" sz="2800" b="1" dirty="0"/>
+              <a:rPr lang="en-US" sz="2800" b="1" dirty="0">
+                <a:solidFill>
+                  <a:schemeClr val="bg1">
+                    <a:lumMod val="65000"/>
+                  </a:schemeClr>
+                </a:solidFill>
+              </a:rPr>
               <a:t>    int n;</a:t>
             </a:r>
           </a:p>
@@ -6481,7 +6179,7 @@
           <p:cNvPr id="30" name="TextBox 29">
             <a:extLst>
               <a:ext uri="{FF2B5EF4-FFF2-40B4-BE49-F238E27FC236}">
-                <a16:creationId xmlns:a16="http://schemas.microsoft.com/office/drawing/2014/main" id="{A6727238-C9AE-794F-B198-48B47FE6FF37}"/>
+                <a16:creationId xmlns:a16="http://schemas.microsoft.com/office/drawing/2014/main" id="{C4A82183-8CC5-A84F-85E4-EC754E09E902}"/>
               </a:ext>
             </a:extLst>
           </p:cNvPr>
@@ -6513,10 +6211,10 @@
       </p:sp>
       <p:sp>
         <p:nvSpPr>
-          <p:cNvPr id="31" name="TextBox 30">
-            <a:extLst>
-              <a:ext uri="{FF2B5EF4-FFF2-40B4-BE49-F238E27FC236}">
-                <a16:creationId xmlns:a16="http://schemas.microsoft.com/office/drawing/2014/main" id="{EDBA273D-1B40-E348-A466-B05CA5CF79D7}"/>
+          <p:cNvPr id="32" name="TextBox 31">
+            <a:extLst>
+              <a:ext uri="{FF2B5EF4-FFF2-40B4-BE49-F238E27FC236}">
+                <a16:creationId xmlns:a16="http://schemas.microsoft.com/office/drawing/2014/main" id="{2AA714EC-0794-F54D-86C5-240D8D24E9FB}"/>
               </a:ext>
             </a:extLst>
           </p:cNvPr>
@@ -6525,8 +6223,43 @@
         </p:nvSpPr>
         <p:spPr>
           <a:xfrm>
-            <a:off x="7769374" y="4251567"/>
-            <a:ext cx="306494" cy="369332"/>
+            <a:off x="6869902" y="2976781"/>
+            <a:ext cx="292068" cy="369332"/>
+          </a:xfrm>
+          <a:prstGeom prst="rect">
+            <a:avLst/>
+          </a:prstGeom>
+          <a:noFill/>
+        </p:spPr>
+        <p:txBody>
+          <a:bodyPr wrap="none" lIns="91440" tIns="45720" rIns="91440" bIns="45720" rtlCol="0" anchor="t">
+            <a:spAutoFit/>
+          </a:bodyPr>
+          <a:lstStyle/>
+          <a:p>
+            <a:r>
+              <a:rPr lang="en-US" dirty="0"/>
+              <a:t>?</a:t>
+            </a:r>
+          </a:p>
+        </p:txBody>
+      </p:sp>
+      <p:sp>
+        <p:nvSpPr>
+          <p:cNvPr id="33" name="TextBox 32">
+            <a:extLst>
+              <a:ext uri="{FF2B5EF4-FFF2-40B4-BE49-F238E27FC236}">
+                <a16:creationId xmlns:a16="http://schemas.microsoft.com/office/drawing/2014/main" id="{480F5C0E-2F00-F841-9E07-5014DB9A4418}"/>
+              </a:ext>
+            </a:extLst>
+          </p:cNvPr>
+          <p:cNvSpPr txBox="1"/>
+          <p:nvPr/>
+        </p:nvSpPr>
+        <p:spPr>
+          <a:xfrm>
+            <a:off x="6869902" y="4409398"/>
+            <a:ext cx="292068" cy="369332"/>
           </a:xfrm>
           <a:prstGeom prst="rect">
             <a:avLst/>
@@ -6541,76 +6274,6 @@
           <a:p>
             <a:r>
               <a:rPr lang="en-US" dirty="0"/>
-              <a:t>n</a:t>
-            </a:r>
-          </a:p>
-        </p:txBody>
-      </p:sp>
-      <p:sp>
-        <p:nvSpPr>
-          <p:cNvPr id="32" name="TextBox 31">
-            <a:extLst>
-              <a:ext uri="{FF2B5EF4-FFF2-40B4-BE49-F238E27FC236}">
-                <a16:creationId xmlns:a16="http://schemas.microsoft.com/office/drawing/2014/main" id="{B7FA4531-8F99-6F47-AC1C-3A9BD7611F9F}"/>
-              </a:ext>
-            </a:extLst>
-          </p:cNvPr>
-          <p:cNvSpPr txBox="1"/>
-          <p:nvPr/>
-        </p:nvSpPr>
-        <p:spPr>
-          <a:xfrm>
-            <a:off x="6869902" y="2976781"/>
-            <a:ext cx="292068" cy="369332"/>
-          </a:xfrm>
-          <a:prstGeom prst="rect">
-            <a:avLst/>
-          </a:prstGeom>
-          <a:noFill/>
-        </p:spPr>
-        <p:txBody>
-          <a:bodyPr wrap="none" lIns="91440" tIns="45720" rIns="91440" bIns="45720" rtlCol="0" anchor="t">
-            <a:spAutoFit/>
-          </a:bodyPr>
-          <a:lstStyle/>
-          <a:p>
-            <a:r>
-              <a:rPr lang="en-US" dirty="0"/>
-              <a:t>?</a:t>
-            </a:r>
-          </a:p>
-        </p:txBody>
-      </p:sp>
-      <p:sp>
-        <p:nvSpPr>
-          <p:cNvPr id="33" name="TextBox 32">
-            <a:extLst>
-              <a:ext uri="{FF2B5EF4-FFF2-40B4-BE49-F238E27FC236}">
-                <a16:creationId xmlns:a16="http://schemas.microsoft.com/office/drawing/2014/main" id="{0BF47C19-08FA-C543-8EE6-8B9CEE65714F}"/>
-              </a:ext>
-            </a:extLst>
-          </p:cNvPr>
-          <p:cNvSpPr txBox="1"/>
-          <p:nvPr/>
-        </p:nvSpPr>
-        <p:spPr>
-          <a:xfrm>
-            <a:off x="6869902" y="4409398"/>
-            <a:ext cx="292068" cy="369332"/>
-          </a:xfrm>
-          <a:prstGeom prst="rect">
-            <a:avLst/>
-          </a:prstGeom>
-          <a:noFill/>
-        </p:spPr>
-        <p:txBody>
-          <a:bodyPr wrap="none" rtlCol="0">
-            <a:spAutoFit/>
-          </a:bodyPr>
-          <a:lstStyle/>
-          <a:p>
-            <a:r>
-              <a:rPr lang="en-US" dirty="0"/>
               <a:t>?</a:t>
             </a:r>
           </a:p>
@@ -6619,7 +6282,7 @@
     </p:spTree>
     <p:extLst>
       <p:ext uri="{BB962C8B-B14F-4D97-AF65-F5344CB8AC3E}">
-        <p14:creationId xmlns:p14="http://schemas.microsoft.com/office/powerpoint/2010/main" val="4096726730"/>
+        <p14:creationId xmlns:p14="http://schemas.microsoft.com/office/powerpoint/2010/main" val="3347865859"/>
       </p:ext>
     </p:extLst>
   </p:cSld>
@@ -6842,7 +6505,7 @@
           <a:noFill/>
         </p:spPr>
         <p:txBody>
-          <a:bodyPr wrap="none" rtlCol="0">
+          <a:bodyPr wrap="square" rtlCol="0">
             <a:spAutoFit/>
           </a:bodyPr>
           <a:lstStyle/>
@@ -7129,7 +6792,13 @@
           </a:p>
           <a:p>
             <a:r>
-              <a:rPr lang="en-US" sz="2800" b="1" dirty="0"/>
+              <a:rPr lang="en-US" sz="2800" b="1" dirty="0">
+                <a:solidFill>
+                  <a:schemeClr val="bg1">
+                    <a:lumMod val="65000"/>
+                  </a:schemeClr>
+                </a:solidFill>
+              </a:rPr>
               <a:t>    n = 5;</a:t>
             </a:r>
           </a:p>
@@ -7198,10 +6867,10 @@
       </p:sp>
       <p:sp>
         <p:nvSpPr>
-          <p:cNvPr id="29" name="TextBox 28">
-            <a:extLst>
-              <a:ext uri="{FF2B5EF4-FFF2-40B4-BE49-F238E27FC236}">
-                <a16:creationId xmlns:a16="http://schemas.microsoft.com/office/drawing/2014/main" id="{65B35E3F-AE77-4148-AA52-12F6318E0AF2}"/>
+          <p:cNvPr id="30" name="TextBox 29">
+            <a:extLst>
+              <a:ext uri="{FF2B5EF4-FFF2-40B4-BE49-F238E27FC236}">
+                <a16:creationId xmlns:a16="http://schemas.microsoft.com/office/drawing/2014/main" id="{A6727238-C9AE-794F-B198-48B47FE6FF37}"/>
               </a:ext>
             </a:extLst>
           </p:cNvPr>
@@ -7233,10 +6902,10 @@
       </p:sp>
       <p:sp>
         <p:nvSpPr>
-          <p:cNvPr id="30" name="TextBox 29">
-            <a:extLst>
-              <a:ext uri="{FF2B5EF4-FFF2-40B4-BE49-F238E27FC236}">
-                <a16:creationId xmlns:a16="http://schemas.microsoft.com/office/drawing/2014/main" id="{76386EC0-22B2-3E4B-B6C0-42E409E268E9}"/>
+          <p:cNvPr id="31" name="TextBox 30">
+            <a:extLst>
+              <a:ext uri="{FF2B5EF4-FFF2-40B4-BE49-F238E27FC236}">
+                <a16:creationId xmlns:a16="http://schemas.microsoft.com/office/drawing/2014/main" id="{EDBA273D-1B40-E348-A466-B05CA5CF79D7}"/>
               </a:ext>
             </a:extLst>
           </p:cNvPr>
@@ -7268,10 +6937,10 @@
       </p:sp>
       <p:sp>
         <p:nvSpPr>
-          <p:cNvPr id="31" name="TextBox 30">
-            <a:extLst>
-              <a:ext uri="{FF2B5EF4-FFF2-40B4-BE49-F238E27FC236}">
-                <a16:creationId xmlns:a16="http://schemas.microsoft.com/office/drawing/2014/main" id="{B02C02DE-C21E-6844-B02C-63659BA5836A}"/>
+          <p:cNvPr id="32" name="TextBox 31">
+            <a:extLst>
+              <a:ext uri="{FF2B5EF4-FFF2-40B4-BE49-F238E27FC236}">
+                <a16:creationId xmlns:a16="http://schemas.microsoft.com/office/drawing/2014/main" id="{B7FA4531-8F99-6F47-AC1C-3A9BD7611F9F}"/>
               </a:ext>
             </a:extLst>
           </p:cNvPr>
@@ -7303,10 +6972,10 @@
       </p:sp>
       <p:sp>
         <p:nvSpPr>
-          <p:cNvPr id="32" name="TextBox 31">
-            <a:extLst>
-              <a:ext uri="{FF2B5EF4-FFF2-40B4-BE49-F238E27FC236}">
-                <a16:creationId xmlns:a16="http://schemas.microsoft.com/office/drawing/2014/main" id="{F29C628F-347A-3845-9F60-32A63F2AA145}"/>
+          <p:cNvPr id="33" name="TextBox 32">
+            <a:extLst>
+              <a:ext uri="{FF2B5EF4-FFF2-40B4-BE49-F238E27FC236}">
+                <a16:creationId xmlns:a16="http://schemas.microsoft.com/office/drawing/2014/main" id="{0BF47C19-08FA-C543-8EE6-8B9CEE65714F}"/>
               </a:ext>
             </a:extLst>
           </p:cNvPr>
@@ -7316,7 +6985,7 @@
         <p:spPr>
           <a:xfrm>
             <a:off x="6869902" y="4409398"/>
-            <a:ext cx="301686" cy="369332"/>
+            <a:ext cx="292068" cy="369332"/>
           </a:xfrm>
           <a:prstGeom prst="rect">
             <a:avLst/>
@@ -7331,7 +7000,7 @@
           <a:p>
             <a:r>
               <a:rPr lang="en-US" dirty="0"/>
-              <a:t>5</a:t>
+              <a:t>?</a:t>
             </a:r>
           </a:p>
         </p:txBody>
@@ -7339,7 +7008,7 @@
     </p:spTree>
     <p:extLst>
       <p:ext uri="{BB962C8B-B14F-4D97-AF65-F5344CB8AC3E}">
-        <p14:creationId xmlns:p14="http://schemas.microsoft.com/office/powerpoint/2010/main" val="1006507578"/>
+        <p14:creationId xmlns:p14="http://schemas.microsoft.com/office/powerpoint/2010/main" val="4096726730"/>
       </p:ext>
     </p:extLst>
   </p:cSld>
@@ -7855,10 +7524,21 @@
           </a:p>
           <a:p>
             <a:r>
-              <a:rPr lang="en-US" sz="2800" b="1" dirty="0"/>
+              <a:rPr lang="en-US" sz="2800" b="1" dirty="0">
+                <a:solidFill>
+                  <a:schemeClr val="bg1">
+                    <a:lumMod val="65000"/>
+                  </a:schemeClr>
+                </a:solidFill>
+              </a:rPr>
               <a:t>    b = &amp;n;</a:t>
             </a:r>
             <a:endParaRPr lang="en-US" sz="2800" b="1" dirty="0">
+              <a:solidFill>
+                <a:schemeClr val="bg1">
+                  <a:lumMod val="65000"/>
+                </a:schemeClr>
+              </a:solidFill>
               <a:cs typeface="Calibri"/>
             </a:endParaRPr>
           </a:p>
@@ -7907,10 +7587,10 @@
       </p:sp>
       <p:sp>
         <p:nvSpPr>
-          <p:cNvPr id="30" name="TextBox 29">
-            <a:extLst>
-              <a:ext uri="{FF2B5EF4-FFF2-40B4-BE49-F238E27FC236}">
-                <a16:creationId xmlns:a16="http://schemas.microsoft.com/office/drawing/2014/main" id="{FD7620ED-8FFF-0243-B415-3EBA6F0C3AC5}"/>
+          <p:cNvPr id="29" name="TextBox 28">
+            <a:extLst>
+              <a:ext uri="{FF2B5EF4-FFF2-40B4-BE49-F238E27FC236}">
+                <a16:creationId xmlns:a16="http://schemas.microsoft.com/office/drawing/2014/main" id="{65B35E3F-AE77-4148-AA52-12F6318E0AF2}"/>
               </a:ext>
             </a:extLst>
           </p:cNvPr>
@@ -7942,10 +7622,10 @@
       </p:sp>
       <p:sp>
         <p:nvSpPr>
-          <p:cNvPr id="31" name="TextBox 30">
-            <a:extLst>
-              <a:ext uri="{FF2B5EF4-FFF2-40B4-BE49-F238E27FC236}">
-                <a16:creationId xmlns:a16="http://schemas.microsoft.com/office/drawing/2014/main" id="{337E97FA-23D7-B041-9392-64B7B3B2F324}"/>
+          <p:cNvPr id="30" name="TextBox 29">
+            <a:extLst>
+              <a:ext uri="{FF2B5EF4-FFF2-40B4-BE49-F238E27FC236}">
+                <a16:creationId xmlns:a16="http://schemas.microsoft.com/office/drawing/2014/main" id="{76386EC0-22B2-3E4B-B6C0-42E409E268E9}"/>
               </a:ext>
             </a:extLst>
           </p:cNvPr>
@@ -7977,10 +7657,10 @@
       </p:sp>
       <p:sp>
         <p:nvSpPr>
-          <p:cNvPr id="34" name="TextBox 33">
-            <a:extLst>
-              <a:ext uri="{FF2B5EF4-FFF2-40B4-BE49-F238E27FC236}">
-                <a16:creationId xmlns:a16="http://schemas.microsoft.com/office/drawing/2014/main" id="{3CBC5A7B-4CD8-C344-90E3-8DA91E29660F}"/>
+          <p:cNvPr id="31" name="TextBox 30">
+            <a:extLst>
+              <a:ext uri="{FF2B5EF4-FFF2-40B4-BE49-F238E27FC236}">
+                <a16:creationId xmlns:a16="http://schemas.microsoft.com/office/drawing/2014/main" id="{B02C02DE-C21E-6844-B02C-63659BA5836A}"/>
               </a:ext>
             </a:extLst>
           </p:cNvPr>
@@ -7989,8 +7669,8 @@
         </p:nvSpPr>
         <p:spPr>
           <a:xfrm>
-            <a:off x="6738657" y="2976781"/>
-            <a:ext cx="652743" cy="369332"/>
+            <a:off x="6869902" y="2976781"/>
+            <a:ext cx="292068" cy="369332"/>
           </a:xfrm>
           <a:prstGeom prst="rect">
             <a:avLst/>
@@ -8005,17 +7685,17 @@
           <a:p>
             <a:r>
               <a:rPr lang="en-US" dirty="0"/>
-              <a:t>5200</a:t>
-            </a:r>
-          </a:p>
-        </p:txBody>
-      </p:sp>
-      <p:sp>
-        <p:nvSpPr>
-          <p:cNvPr id="35" name="TextBox 34">
-            <a:extLst>
-              <a:ext uri="{FF2B5EF4-FFF2-40B4-BE49-F238E27FC236}">
-                <a16:creationId xmlns:a16="http://schemas.microsoft.com/office/drawing/2014/main" id="{3EFBBE60-7C5A-0F45-8F06-575A953CCCE2}"/>
+              <a:t>?</a:t>
+            </a:r>
+          </a:p>
+        </p:txBody>
+      </p:sp>
+      <p:sp>
+        <p:nvSpPr>
+          <p:cNvPr id="32" name="TextBox 31">
+            <a:extLst>
+              <a:ext uri="{FF2B5EF4-FFF2-40B4-BE49-F238E27FC236}">
+                <a16:creationId xmlns:a16="http://schemas.microsoft.com/office/drawing/2014/main" id="{F29C628F-347A-3845-9F60-32A63F2AA145}"/>
               </a:ext>
             </a:extLst>
           </p:cNvPr>
@@ -8048,7 +7728,7 @@
     </p:spTree>
     <p:extLst>
       <p:ext uri="{BB962C8B-B14F-4D97-AF65-F5344CB8AC3E}">
-        <p14:creationId xmlns:p14="http://schemas.microsoft.com/office/powerpoint/2010/main" val="1709289144"/>
+        <p14:creationId xmlns:p14="http://schemas.microsoft.com/office/powerpoint/2010/main" val="1006507578"/>
       </p:ext>
     </p:extLst>
   </p:cSld>
@@ -8526,7 +8206,7 @@
         <p:spPr>
           <a:xfrm>
             <a:off x="728824" y="2660438"/>
-            <a:ext cx="2487925" cy="4401205"/>
+            <a:ext cx="2487925" cy="3108543"/>
           </a:xfrm>
           <a:prstGeom prst="rect">
             <a:avLst/>
@@ -8567,40 +8247,9 @@
               <a:rPr lang="en-US" sz="2800" b="1" dirty="0"/>
               <a:t>    b = &amp;n;</a:t>
             </a:r>
-          </a:p>
-          <a:p>
-            <a:r>
-              <a:rPr lang="en-US" sz="2800" b="1" dirty="0">
-                <a:cs typeface="Calibri"/>
-              </a:rPr>
-              <a:t>    n = 6;</a:t>
-            </a:r>
-          </a:p>
-          <a:p>
-            <a:r>
-              <a:rPr lang="en-US" sz="2800" b="1" dirty="0">
-                <a:solidFill>
-                  <a:schemeClr val="bg1">
-                    <a:lumMod val="65000"/>
-                  </a:schemeClr>
-                </a:solidFill>
-                <a:cs typeface="Calibri"/>
-              </a:rPr>
-              <a:t>    *b += 1;</a:t>
-            </a:r>
-          </a:p>
-          <a:p>
-            <a:r>
-              <a:rPr lang="en-US" sz="2800" b="1" dirty="0">
-                <a:solidFill>
-                  <a:schemeClr val="bg1">
-                    <a:lumMod val="65000"/>
-                  </a:schemeClr>
-                </a:solidFill>
-                <a:cs typeface="Calibri"/>
-              </a:rPr>
-              <a:t>    *b = 2 * (*b);</a:t>
-            </a:r>
+            <a:endParaRPr lang="en-US" sz="2800" b="1" dirty="0">
+              <a:cs typeface="Calibri"/>
+            </a:endParaRPr>
           </a:p>
           <a:p>
             <a:endParaRPr lang="en-US" sz="2800" b="1" dirty="0"/>
@@ -8780,7 +8429,7 @@
           <a:p>
             <a:r>
               <a:rPr lang="en-US" dirty="0"/>
-              <a:t>6</a:t>
+              <a:t>5</a:t>
             </a:r>
           </a:p>
         </p:txBody>
@@ -8788,7 +8437,7 @@
     </p:spTree>
     <p:extLst>
       <p:ext uri="{BB962C8B-B14F-4D97-AF65-F5344CB8AC3E}">
-        <p14:creationId xmlns:p14="http://schemas.microsoft.com/office/powerpoint/2010/main" val="2237677669"/>
+        <p14:creationId xmlns:p14="http://schemas.microsoft.com/office/powerpoint/2010/main" val="1709289144"/>
       </p:ext>
     </p:extLst>
   </p:cSld>
@@ -9458,6 +9107,11 @@
           <a:p>
             <a:r>
               <a:rPr lang="en-US" sz="2800" b="1" dirty="0">
+                <a:solidFill>
+                  <a:schemeClr val="bg1">
+                    <a:lumMod val="65000"/>
+                  </a:schemeClr>
+                </a:solidFill>
                 <a:cs typeface="Calibri"/>
               </a:rPr>
               <a:t>    *b += 1;</a:t>
@@ -9654,7 +9308,7 @@
           <a:p>
             <a:r>
               <a:rPr lang="en-US" dirty="0"/>
-              <a:t>7</a:t>
+              <a:t>6</a:t>
             </a:r>
           </a:p>
         </p:txBody>
@@ -9662,7 +9316,7 @@
     </p:spTree>
     <p:extLst>
       <p:ext uri="{BB962C8B-B14F-4D97-AF65-F5344CB8AC3E}">
-        <p14:creationId xmlns:p14="http://schemas.microsoft.com/office/powerpoint/2010/main" val="993063390"/>
+        <p14:creationId xmlns:p14="http://schemas.microsoft.com/office/powerpoint/2010/main" val="2237677669"/>
       </p:ext>
     </p:extLst>
   </p:cSld>
@@ -10140,7 +9794,7 @@
         <p:spPr>
           <a:xfrm>
             <a:off x="728824" y="2660438"/>
-            <a:ext cx="2487925" cy="3970318"/>
+            <a:ext cx="2487925" cy="4401205"/>
           </a:xfrm>
           <a:prstGeom prst="rect">
             <a:avLst/>
@@ -10201,6 +9855,11 @@
           <a:p>
             <a:r>
               <a:rPr lang="en-US" sz="2800" b="1" dirty="0">
+                <a:solidFill>
+                  <a:schemeClr val="bg1">
+                    <a:lumMod val="65000"/>
+                  </a:schemeClr>
+                </a:solidFill>
                 <a:cs typeface="Calibri"/>
               </a:rPr>
               <a:t>    *b = 2 * (*b);</a:t>
@@ -10209,6 +9868,9 @@
           <a:p>
             <a:endParaRPr lang="en-US" sz="2800" b="1" dirty="0"/>
           </a:p>
+          <a:p>
+            <a:endParaRPr lang="en-US" sz="2800" b="1" dirty="0"/>
+          </a:p>
         </p:txBody>
       </p:sp>
       <p:sp>
@@ -10366,7 +10028,7 @@
         <p:spPr>
           <a:xfrm>
             <a:off x="6869902" y="4409398"/>
-            <a:ext cx="418704" cy="369332"/>
+            <a:ext cx="301686" cy="369332"/>
           </a:xfrm>
           <a:prstGeom prst="rect">
             <a:avLst/>
@@ -10381,7 +10043,7 @@
           <a:p>
             <a:r>
               <a:rPr lang="en-US" dirty="0"/>
-              <a:t>14</a:t>
+              <a:t>7</a:t>
             </a:r>
           </a:p>
         </p:txBody>
@@ -10389,7 +10051,7 @@
     </p:spTree>
     <p:extLst>
       <p:ext uri="{BB962C8B-B14F-4D97-AF65-F5344CB8AC3E}">
-        <p14:creationId xmlns:p14="http://schemas.microsoft.com/office/powerpoint/2010/main" val="248537623"/>
+        <p14:creationId xmlns:p14="http://schemas.microsoft.com/office/powerpoint/2010/main" val="993063390"/>
       </p:ext>
     </p:extLst>
   </p:cSld>
@@ -10867,7 +10529,7 @@
         <p:spPr>
           <a:xfrm>
             <a:off x="728824" y="2660438"/>
-            <a:ext cx="2487925" cy="4401205"/>
+            <a:ext cx="2487925" cy="3970318"/>
           </a:xfrm>
           <a:prstGeom prst="rect">
             <a:avLst/>
@@ -10934,26 +10596,6 @@
             </a:r>
           </a:p>
           <a:p>
-            <a:r>
-              <a:rPr lang="en-US" sz="2800" b="1" dirty="0">
-                <a:solidFill>
-                  <a:schemeClr val="bg1">
-                    <a:lumMod val="65000"/>
-                  </a:schemeClr>
-                </a:solidFill>
-                <a:cs typeface="Calibri"/>
-              </a:rPr>
-              <a:t>    b = 2 * (*b);</a:t>
-            </a:r>
-            <a:endParaRPr lang="en-US" sz="2800" b="1" dirty="0">
-              <a:solidFill>
-                <a:schemeClr val="bg1">
-                  <a:lumMod val="65000"/>
-                </a:schemeClr>
-              </a:solidFill>
-            </a:endParaRPr>
-          </a:p>
-          <a:p>
             <a:endParaRPr lang="en-US" sz="2800" b="1" dirty="0"/>
           </a:p>
         </p:txBody>
@@ -11136,7 +10778,7 @@
     </p:spTree>
     <p:extLst>
       <p:ext uri="{BB962C8B-B14F-4D97-AF65-F5344CB8AC3E}">
-        <p14:creationId xmlns:p14="http://schemas.microsoft.com/office/powerpoint/2010/main" val="974974931"/>
+        <p14:creationId xmlns:p14="http://schemas.microsoft.com/office/powerpoint/2010/main" val="248537623"/>
       </p:ext>
     </p:extLst>
   </p:cSld>
@@ -11683,11 +11325,22 @@
           <a:p>
             <a:r>
               <a:rPr lang="en-US" sz="2800" b="1" dirty="0">
+                <a:solidFill>
+                  <a:schemeClr val="bg1">
+                    <a:lumMod val="65000"/>
+                  </a:schemeClr>
+                </a:solidFill>
                 <a:cs typeface="Calibri"/>
               </a:rPr>
               <a:t>    b = 2 * (*b);</a:t>
             </a:r>
-            <a:endParaRPr lang="en-US" sz="2800" b="1" dirty="0"/>
+            <a:endParaRPr lang="en-US" sz="2800" b="1" dirty="0">
+              <a:solidFill>
+                <a:schemeClr val="bg1">
+                  <a:lumMod val="65000"/>
+                </a:schemeClr>
+              </a:solidFill>
+            </a:endParaRPr>
           </a:p>
           <a:p>
             <a:endParaRPr lang="en-US" sz="2800" b="1" dirty="0"/>
@@ -11813,8 +11466,8 @@
         </p:nvSpPr>
         <p:spPr>
           <a:xfrm>
-            <a:off x="6866835" y="2979264"/>
-            <a:ext cx="418704" cy="369332"/>
+            <a:off x="6738657" y="2976781"/>
+            <a:ext cx="652743" cy="369332"/>
           </a:xfrm>
           <a:prstGeom prst="rect">
             <a:avLst/>
@@ -11829,7 +11482,7 @@
           <a:p>
             <a:r>
               <a:rPr lang="en-US" dirty="0"/>
-              <a:t>28</a:t>
+              <a:t>5200</a:t>
             </a:r>
           </a:p>
         </p:txBody>
@@ -11872,7 +11525,7 @@
     </p:spTree>
     <p:extLst>
       <p:ext uri="{BB962C8B-B14F-4D97-AF65-F5344CB8AC3E}">
-        <p14:creationId xmlns:p14="http://schemas.microsoft.com/office/powerpoint/2010/main" val="2850006677"/>
+        <p14:creationId xmlns:p14="http://schemas.microsoft.com/office/powerpoint/2010/main" val="974974931"/>
       </p:ext>
     </p:extLst>
   </p:cSld>
@@ -12605,49 +12258,10 @@
           </a:p>
         </p:txBody>
       </p:sp>
-      <p:sp>
-        <p:nvSpPr>
-          <p:cNvPr id="21" name="TextBox 20">
-            <a:extLst>
-              <a:ext uri="{FF2B5EF4-FFF2-40B4-BE49-F238E27FC236}">
-                <a16:creationId xmlns:a16="http://schemas.microsoft.com/office/drawing/2014/main" id="{035C9B4C-8E36-9E4D-AF7C-5E0419CC4393}"/>
-              </a:ext>
-            </a:extLst>
-          </p:cNvPr>
-          <p:cNvSpPr txBox="1"/>
-          <p:nvPr/>
-        </p:nvSpPr>
-        <p:spPr>
-          <a:xfrm>
-            <a:off x="4220753" y="5617798"/>
-            <a:ext cx="4580735" cy="461665"/>
-          </a:xfrm>
-          <a:prstGeom prst="rect">
-            <a:avLst/>
-          </a:prstGeom>
-          <a:noFill/>
-        </p:spPr>
-        <p:txBody>
-          <a:bodyPr wrap="square" rtlCol="0">
-            <a:spAutoFit/>
-          </a:bodyPr>
-          <a:lstStyle/>
-          <a:p>
-            <a:r>
-              <a:rPr lang="en-US" sz="2400" dirty="0">
-                <a:solidFill>
-                  <a:srgbClr val="C00000"/>
-                </a:solidFill>
-              </a:rPr>
-              <a:t>ptr0.c shows seg fault accessing *b</a:t>
-            </a:r>
-          </a:p>
-        </p:txBody>
-      </p:sp>
     </p:spTree>
     <p:extLst>
       <p:ext uri="{BB962C8B-B14F-4D97-AF65-F5344CB8AC3E}">
-        <p14:creationId xmlns:p14="http://schemas.microsoft.com/office/powerpoint/2010/main" val="3129366765"/>
+        <p14:creationId xmlns:p14="http://schemas.microsoft.com/office/powerpoint/2010/main" val="2850006677"/>
       </p:ext>
     </p:extLst>
   </p:cSld>
@@ -12676,7 +12290,13 @@
       </p:grpSpPr>
       <p:sp>
         <p:nvSpPr>
-          <p:cNvPr id="2" name="Title 1"/>
+          <p:cNvPr id="2" name="Title 1">
+            <a:extLst>
+              <a:ext uri="{FF2B5EF4-FFF2-40B4-BE49-F238E27FC236}">
+                <a16:creationId xmlns:a16="http://schemas.microsoft.com/office/drawing/2014/main" id="{279F6F2D-3D26-4C48-A38A-3254E82DDFAC}"/>
+              </a:ext>
+            </a:extLst>
+          </p:cNvPr>
           <p:cNvSpPr>
             <a:spLocks noGrp="1"/>
           </p:cNvSpPr>
@@ -12691,42 +12311,20 @@
           <a:p>
             <a:r>
               <a:rPr lang="en-US" dirty="0"/>
-              <a:t>Functions with Output Parameters</a:t>
-            </a:r>
-          </a:p>
-        </p:txBody>
-      </p:sp>
-      <p:sp>
-        <p:nvSpPr>
-          <p:cNvPr id="3" name="Content Placeholder 2"/>
-          <p:cNvSpPr>
-            <a:spLocks noGrp="1"/>
-          </p:cNvSpPr>
-          <p:nvPr>
-            <p:ph idx="1"/>
-          </p:nvPr>
-        </p:nvSpPr>
-        <p:spPr/>
-        <p:txBody>
-          <a:bodyPr/>
-          <a:lstStyle/>
-          <a:p>
-            <a:r>
-              <a:rPr lang="en-US" dirty="0"/>
-              <a:t>We’ve used the return statement to send back one result value from a function.</a:t>
-            </a:r>
-          </a:p>
-          <a:p>
-            <a:r>
-              <a:rPr lang="en-US" dirty="0"/>
-              <a:t>We can also use output parameters to return multiple results from a function.</a:t>
-            </a:r>
-          </a:p>
-        </p:txBody>
-      </p:sp>
-      <p:sp>
-        <p:nvSpPr>
-          <p:cNvPr id="4" name="Footer Placeholder 3"/>
+              <a:t>Pointers</a:t>
+            </a:r>
+          </a:p>
+        </p:txBody>
+      </p:sp>
+      <p:sp>
+        <p:nvSpPr>
+          <p:cNvPr id="4" name="Footer Placeholder 3">
+            <a:extLst>
+              <a:ext uri="{FF2B5EF4-FFF2-40B4-BE49-F238E27FC236}">
+                <a16:creationId xmlns:a16="http://schemas.microsoft.com/office/drawing/2014/main" id="{F3E3D67A-78E0-1B40-A105-FE5460FEDCF5}"/>
+              </a:ext>
+            </a:extLst>
+          </p:cNvPr>
           <p:cNvSpPr>
             <a:spLocks noGrp="1"/>
           </p:cNvSpPr>
@@ -12748,7 +12346,13 @@
       </p:sp>
       <p:sp>
         <p:nvSpPr>
-          <p:cNvPr id="5" name="Slide Number Placeholder 4"/>
+          <p:cNvPr id="5" name="Slide Number Placeholder 4">
+            <a:extLst>
+              <a:ext uri="{FF2B5EF4-FFF2-40B4-BE49-F238E27FC236}">
+                <a16:creationId xmlns:a16="http://schemas.microsoft.com/office/drawing/2014/main" id="{356FB9C2-2726-C64F-B527-C337943C81A5}"/>
+              </a:ext>
+            </a:extLst>
+          </p:cNvPr>
           <p:cNvSpPr>
             <a:spLocks noGrp="1"/>
           </p:cNvSpPr>
@@ -12769,64 +12373,670 @@
           </a:p>
         </p:txBody>
       </p:sp>
-      <p:pic>
-        <p:nvPicPr>
-          <p:cNvPr id="4098" name="Picture 2"/>
-          <p:cNvPicPr>
-            <a:picLocks noChangeAspect="1" noChangeArrowheads="1"/>
-          </p:cNvPicPr>
+      <p:sp>
+        <p:nvSpPr>
+          <p:cNvPr id="13" name="Rectangle 12">
+            <a:extLst>
+              <a:ext uri="{FF2B5EF4-FFF2-40B4-BE49-F238E27FC236}">
+                <a16:creationId xmlns:a16="http://schemas.microsoft.com/office/drawing/2014/main" id="{AAB60E3E-166F-A14B-9773-FE53A099C918}"/>
+              </a:ext>
+            </a:extLst>
+          </p:cNvPr>
+          <p:cNvSpPr/>
           <p:nvPr/>
-        </p:nvPicPr>
-        <p:blipFill>
-          <a:blip r:embed="rId2">
-            <a:extLst>
-              <a:ext uri="{28A0092B-C50C-407E-A947-70E740481C1C}">
-                <a14:useLocalDpi xmlns:a14="http://schemas.microsoft.com/office/drawing/2010/main" val="0"/>
-              </a:ext>
-            </a:extLst>
-          </a:blip>
-          <a:srcRect/>
-          <a:stretch>
-            <a:fillRect/>
-          </a:stretch>
-        </p:blipFill>
-        <p:spPr bwMode="auto">
-          <a:xfrm>
-            <a:off x="60634" y="4038600"/>
-            <a:ext cx="9083365" cy="1687666"/>
+        </p:nvSpPr>
+        <p:spPr>
+          <a:xfrm>
+            <a:off x="6553200" y="2814854"/>
+            <a:ext cx="990600" cy="762001"/>
           </a:xfrm>
           <a:prstGeom prst="rect">
             <a:avLst/>
           </a:prstGeom>
           <a:noFill/>
-          <a:ln>
-            <a:noFill/>
-          </a:ln>
-          <a:extLst>
-            <a:ext uri="{909E8E84-426E-40DD-AFC4-6F175D3DCCD1}">
-              <a14:hiddenFill xmlns:a14="http://schemas.microsoft.com/office/drawing/2010/main">
+        </p:spPr>
+        <p:style>
+          <a:lnRef idx="2">
+            <a:schemeClr val="accent1">
+              <a:shade val="50000"/>
+            </a:schemeClr>
+          </a:lnRef>
+          <a:fillRef idx="1">
+            <a:schemeClr val="accent1"/>
+          </a:fillRef>
+          <a:effectRef idx="0">
+            <a:schemeClr val="accent1"/>
+          </a:effectRef>
+          <a:fontRef idx="minor">
+            <a:schemeClr val="lt1"/>
+          </a:fontRef>
+        </p:style>
+        <p:txBody>
+          <a:bodyPr rtlCol="0" anchor="ctr"/>
+          <a:lstStyle/>
+          <a:p>
+            <a:pPr algn="ctr"/>
+            <a:endParaRPr lang="en-US"/>
+          </a:p>
+        </p:txBody>
+      </p:sp>
+      <p:sp>
+        <p:nvSpPr>
+          <p:cNvPr id="15" name="TextBox 14">
+            <a:extLst>
+              <a:ext uri="{FF2B5EF4-FFF2-40B4-BE49-F238E27FC236}">
+                <a16:creationId xmlns:a16="http://schemas.microsoft.com/office/drawing/2014/main" id="{43F7F812-B078-404E-91AB-02C945102C90}"/>
+              </a:ext>
+            </a:extLst>
+          </p:cNvPr>
+          <p:cNvSpPr txBox="1"/>
+          <p:nvPr/>
+        </p:nvSpPr>
+        <p:spPr>
+          <a:xfrm>
+            <a:off x="5650921" y="2891055"/>
+            <a:ext cx="944489" cy="707886"/>
+          </a:xfrm>
+          <a:prstGeom prst="rect">
+            <a:avLst/>
+          </a:prstGeom>
+          <a:noFill/>
+        </p:spPr>
+        <p:txBody>
+          <a:bodyPr wrap="none" rtlCol="0">
+            <a:spAutoFit/>
+          </a:bodyPr>
+          <a:lstStyle/>
+          <a:p>
+            <a:r>
+              <a:rPr lang="en-US" sz="2000" dirty="0"/>
+              <a:t>0x5100</a:t>
+            </a:r>
+          </a:p>
+          <a:p>
+            <a:r>
+              <a:rPr lang="en-US" sz="2000" dirty="0"/>
+              <a:t>0x5108</a:t>
+            </a:r>
+          </a:p>
+        </p:txBody>
+      </p:sp>
+      <p:sp>
+        <p:nvSpPr>
+          <p:cNvPr id="17" name="TextBox 16">
+            <a:extLst>
+              <a:ext uri="{FF2B5EF4-FFF2-40B4-BE49-F238E27FC236}">
+                <a16:creationId xmlns:a16="http://schemas.microsoft.com/office/drawing/2014/main" id="{9C0D55F0-5ABE-7E4A-AF95-FC54E9C3A923}"/>
+              </a:ext>
+            </a:extLst>
+          </p:cNvPr>
+          <p:cNvSpPr txBox="1"/>
+          <p:nvPr/>
+        </p:nvSpPr>
+        <p:spPr>
+          <a:xfrm>
+            <a:off x="7618391" y="2819320"/>
+            <a:ext cx="184731" cy="707886"/>
+          </a:xfrm>
+          <a:prstGeom prst="rect">
+            <a:avLst/>
+          </a:prstGeom>
+          <a:noFill/>
+        </p:spPr>
+        <p:txBody>
+          <a:bodyPr wrap="none" rtlCol="0">
+            <a:spAutoFit/>
+          </a:bodyPr>
+          <a:lstStyle/>
+          <a:p>
+            <a:endParaRPr lang="en-US" sz="2000" dirty="0"/>
+          </a:p>
+          <a:p>
+            <a:endParaRPr lang="en-US" sz="2000" dirty="0"/>
+          </a:p>
+        </p:txBody>
+      </p:sp>
+      <p:sp>
+        <p:nvSpPr>
+          <p:cNvPr id="18" name="TextBox 17">
+            <a:extLst>
+              <a:ext uri="{FF2B5EF4-FFF2-40B4-BE49-F238E27FC236}">
+                <a16:creationId xmlns:a16="http://schemas.microsoft.com/office/drawing/2014/main" id="{AF363031-1ABC-3845-B9C1-85B329832D1C}"/>
+              </a:ext>
+            </a:extLst>
+          </p:cNvPr>
+          <p:cNvSpPr txBox="1"/>
+          <p:nvPr/>
+        </p:nvSpPr>
+        <p:spPr>
+          <a:xfrm>
+            <a:off x="6777537" y="3218566"/>
+            <a:ext cx="184731" cy="369332"/>
+          </a:xfrm>
+          <a:prstGeom prst="rect">
+            <a:avLst/>
+          </a:prstGeom>
+          <a:noFill/>
+        </p:spPr>
+        <p:txBody>
+          <a:bodyPr wrap="none" lIns="91440" tIns="45720" rIns="91440" bIns="45720" rtlCol="0" anchor="t">
+            <a:spAutoFit/>
+          </a:bodyPr>
+          <a:lstStyle/>
+          <a:p>
+            <a:endParaRPr lang="en-US" dirty="0">
+              <a:ea typeface="Calibri"/>
+              <a:cs typeface="Calibri"/>
+            </a:endParaRPr>
+          </a:p>
+        </p:txBody>
+      </p:sp>
+      <p:sp>
+        <p:nvSpPr>
+          <p:cNvPr id="19" name="TextBox 18">
+            <a:extLst>
+              <a:ext uri="{FF2B5EF4-FFF2-40B4-BE49-F238E27FC236}">
+                <a16:creationId xmlns:a16="http://schemas.microsoft.com/office/drawing/2014/main" id="{CED84787-06DD-844A-8C5C-715C8DCECC3C}"/>
+              </a:ext>
+            </a:extLst>
+          </p:cNvPr>
+          <p:cNvSpPr txBox="1"/>
+          <p:nvPr/>
+        </p:nvSpPr>
+        <p:spPr>
+          <a:xfrm>
+            <a:off x="6897923" y="3741265"/>
+            <a:ext cx="343364" cy="369332"/>
+          </a:xfrm>
+          <a:prstGeom prst="rect">
+            <a:avLst/>
+          </a:prstGeom>
+          <a:noFill/>
+        </p:spPr>
+        <p:txBody>
+          <a:bodyPr wrap="none" rtlCol="0">
+            <a:spAutoFit/>
+          </a:bodyPr>
+          <a:lstStyle/>
+          <a:p>
+            <a:r>
+              <a:rPr lang="en-US" dirty="0"/>
+              <a:t>…</a:t>
+            </a:r>
+          </a:p>
+        </p:txBody>
+      </p:sp>
+      <p:sp>
+        <p:nvSpPr>
+          <p:cNvPr id="20" name="Rectangle 19">
+            <a:extLst>
+              <a:ext uri="{FF2B5EF4-FFF2-40B4-BE49-F238E27FC236}">
+                <a16:creationId xmlns:a16="http://schemas.microsoft.com/office/drawing/2014/main" id="{462E7ED2-7E8E-FE4A-9464-893CE8E63F30}"/>
+              </a:ext>
+            </a:extLst>
+          </p:cNvPr>
+          <p:cNvSpPr/>
+          <p:nvPr/>
+        </p:nvSpPr>
+        <p:spPr>
+          <a:xfrm>
+            <a:off x="6553200" y="4256031"/>
+            <a:ext cx="990600" cy="762001"/>
+          </a:xfrm>
+          <a:prstGeom prst="rect">
+            <a:avLst/>
+          </a:prstGeom>
+          <a:noFill/>
+        </p:spPr>
+        <p:style>
+          <a:lnRef idx="2">
+            <a:schemeClr val="accent1">
+              <a:shade val="50000"/>
+            </a:schemeClr>
+          </a:lnRef>
+          <a:fillRef idx="1">
+            <a:schemeClr val="accent1"/>
+          </a:fillRef>
+          <a:effectRef idx="0">
+            <a:schemeClr val="accent1"/>
+          </a:effectRef>
+          <a:fontRef idx="minor">
+            <a:schemeClr val="lt1"/>
+          </a:fontRef>
+        </p:style>
+        <p:txBody>
+          <a:bodyPr rtlCol="0" anchor="ctr"/>
+          <a:lstStyle/>
+          <a:p>
+            <a:pPr algn="ctr"/>
+            <a:endParaRPr lang="en-US"/>
+          </a:p>
+        </p:txBody>
+      </p:sp>
+      <p:sp>
+        <p:nvSpPr>
+          <p:cNvPr id="22" name="TextBox 21">
+            <a:extLst>
+              <a:ext uri="{FF2B5EF4-FFF2-40B4-BE49-F238E27FC236}">
+                <a16:creationId xmlns:a16="http://schemas.microsoft.com/office/drawing/2014/main" id="{6C856145-698D-6940-B8EE-80DC3A094143}"/>
+              </a:ext>
+            </a:extLst>
+          </p:cNvPr>
+          <p:cNvSpPr txBox="1"/>
+          <p:nvPr/>
+        </p:nvSpPr>
+        <p:spPr>
+          <a:xfrm>
+            <a:off x="5650921" y="4332232"/>
+            <a:ext cx="944489" cy="707886"/>
+          </a:xfrm>
+          <a:prstGeom prst="rect">
+            <a:avLst/>
+          </a:prstGeom>
+          <a:noFill/>
+        </p:spPr>
+        <p:txBody>
+          <a:bodyPr wrap="none" rtlCol="0">
+            <a:spAutoFit/>
+          </a:bodyPr>
+          <a:lstStyle/>
+          <a:p>
+            <a:r>
+              <a:rPr lang="en-US" sz="2000" dirty="0"/>
+              <a:t>0x5200</a:t>
+            </a:r>
+          </a:p>
+          <a:p>
+            <a:r>
+              <a:rPr lang="en-US" sz="2000" dirty="0"/>
+              <a:t>0x5204</a:t>
+            </a:r>
+          </a:p>
+        </p:txBody>
+      </p:sp>
+      <p:sp>
+        <p:nvSpPr>
+          <p:cNvPr id="24" name="TextBox 23">
+            <a:extLst>
+              <a:ext uri="{FF2B5EF4-FFF2-40B4-BE49-F238E27FC236}">
+                <a16:creationId xmlns:a16="http://schemas.microsoft.com/office/drawing/2014/main" id="{CFB9C02E-8302-2349-A343-317EEADAA02F}"/>
+              </a:ext>
+            </a:extLst>
+          </p:cNvPr>
+          <p:cNvSpPr txBox="1"/>
+          <p:nvPr/>
+        </p:nvSpPr>
+        <p:spPr>
+          <a:xfrm>
+            <a:off x="7618391" y="4260497"/>
+            <a:ext cx="184731" cy="707886"/>
+          </a:xfrm>
+          <a:prstGeom prst="rect">
+            <a:avLst/>
+          </a:prstGeom>
+          <a:noFill/>
+        </p:spPr>
+        <p:txBody>
+          <a:bodyPr wrap="none" rtlCol="0">
+            <a:spAutoFit/>
+          </a:bodyPr>
+          <a:lstStyle/>
+          <a:p>
+            <a:endParaRPr lang="en-US" sz="2000" dirty="0"/>
+          </a:p>
+          <a:p>
+            <a:endParaRPr lang="en-US" sz="2000" dirty="0"/>
+          </a:p>
+        </p:txBody>
+      </p:sp>
+      <p:sp>
+        <p:nvSpPr>
+          <p:cNvPr id="25" name="TextBox 24">
+            <a:extLst>
+              <a:ext uri="{FF2B5EF4-FFF2-40B4-BE49-F238E27FC236}">
+                <a16:creationId xmlns:a16="http://schemas.microsoft.com/office/drawing/2014/main" id="{4058B56C-9ED3-6D4F-9770-20C89FE3D0E8}"/>
+              </a:ext>
+            </a:extLst>
+          </p:cNvPr>
+          <p:cNvSpPr txBox="1"/>
+          <p:nvPr/>
+        </p:nvSpPr>
+        <p:spPr>
+          <a:xfrm>
+            <a:off x="6897923" y="5182442"/>
+            <a:ext cx="343364" cy="369332"/>
+          </a:xfrm>
+          <a:prstGeom prst="rect">
+            <a:avLst/>
+          </a:prstGeom>
+          <a:noFill/>
+        </p:spPr>
+        <p:txBody>
+          <a:bodyPr wrap="none" rtlCol="0">
+            <a:spAutoFit/>
+          </a:bodyPr>
+          <a:lstStyle/>
+          <a:p>
+            <a:r>
+              <a:rPr lang="en-US" dirty="0"/>
+              <a:t>…</a:t>
+            </a:r>
+          </a:p>
+        </p:txBody>
+      </p:sp>
+      <p:sp>
+        <p:nvSpPr>
+          <p:cNvPr id="26" name="TextBox 25">
+            <a:extLst>
+              <a:ext uri="{FF2B5EF4-FFF2-40B4-BE49-F238E27FC236}">
+                <a16:creationId xmlns:a16="http://schemas.microsoft.com/office/drawing/2014/main" id="{70A68636-2023-8247-84C6-AA1931A1AA7A}"/>
+              </a:ext>
+            </a:extLst>
+          </p:cNvPr>
+          <p:cNvSpPr txBox="1"/>
+          <p:nvPr/>
+        </p:nvSpPr>
+        <p:spPr>
+          <a:xfrm>
+            <a:off x="728824" y="2660438"/>
+            <a:ext cx="2487925" cy="4401205"/>
+          </a:xfrm>
+          <a:prstGeom prst="rect">
+            <a:avLst/>
+          </a:prstGeom>
+          <a:noFill/>
+        </p:spPr>
+        <p:txBody>
+          <a:bodyPr wrap="none" lIns="91440" tIns="45720" rIns="91440" bIns="45720" rtlCol="0" anchor="t">
+            <a:spAutoFit/>
+          </a:bodyPr>
+          <a:lstStyle/>
+          <a:p>
+            <a:r>
+              <a:rPr lang="en-US" sz="2800" b="1" dirty="0"/>
+              <a:t>int main(void) {</a:t>
+            </a:r>
+          </a:p>
+          <a:p>
+            <a:r>
+              <a:rPr lang="en-US" sz="2800" b="1" dirty="0"/>
+              <a:t>    int *b;</a:t>
+            </a:r>
+          </a:p>
+          <a:p>
+            <a:r>
+              <a:rPr lang="en-US" sz="2800" b="1" dirty="0"/>
+              <a:t>    int n;</a:t>
+            </a:r>
+          </a:p>
+          <a:p>
+            <a:r>
+              <a:rPr lang="en-US" sz="2800" b="1" dirty="0"/>
+              <a:t>    n = 5;</a:t>
+            </a:r>
+          </a:p>
+          <a:p>
+            <a:r>
+              <a:rPr lang="en-US" sz="2800" b="1" dirty="0"/>
+              <a:t>    b = &amp;n;</a:t>
+            </a:r>
+          </a:p>
+          <a:p>
+            <a:r>
+              <a:rPr lang="en-US" sz="2800" b="1" dirty="0">
+                <a:cs typeface="Calibri"/>
+              </a:rPr>
+              <a:t>    n = 6;</a:t>
+            </a:r>
+          </a:p>
+          <a:p>
+            <a:r>
+              <a:rPr lang="en-US" sz="2800" b="1" dirty="0">
+                <a:cs typeface="Calibri"/>
+              </a:rPr>
+              <a:t>    *b += 1;</a:t>
+            </a:r>
+          </a:p>
+          <a:p>
+            <a:r>
+              <a:rPr lang="en-US" sz="2800" b="1" dirty="0">
+                <a:cs typeface="Calibri"/>
+              </a:rPr>
+              <a:t>    *b = 2 * (*b);</a:t>
+            </a:r>
+          </a:p>
+          <a:p>
+            <a:r>
+              <a:rPr lang="en-US" sz="2800" b="1" dirty="0">
+                <a:cs typeface="Calibri"/>
+              </a:rPr>
+              <a:t>    b = 2 * (*b);</a:t>
+            </a:r>
+            <a:endParaRPr lang="en-US" sz="2800" b="1" dirty="0"/>
+          </a:p>
+          <a:p>
+            <a:endParaRPr lang="en-US" sz="2800" b="1" dirty="0"/>
+          </a:p>
+        </p:txBody>
+      </p:sp>
+      <p:sp>
+        <p:nvSpPr>
+          <p:cNvPr id="27" name="Content Placeholder 2">
+            <a:extLst>
+              <a:ext uri="{FF2B5EF4-FFF2-40B4-BE49-F238E27FC236}">
+                <a16:creationId xmlns:a16="http://schemas.microsoft.com/office/drawing/2014/main" id="{A56E8ABD-81EE-6E45-A9C1-8BCD10B19708}"/>
+              </a:ext>
+            </a:extLst>
+          </p:cNvPr>
+          <p:cNvSpPr>
+            <a:spLocks noGrp="1"/>
+          </p:cNvSpPr>
+          <p:nvPr>
+            <p:ph idx="1"/>
+          </p:nvPr>
+        </p:nvSpPr>
+        <p:spPr>
+          <a:xfrm>
+            <a:off x="457200" y="1600201"/>
+            <a:ext cx="8229600" cy="1040250"/>
+          </a:xfrm>
+        </p:spPr>
+        <p:txBody>
+          <a:bodyPr>
+            <a:normAutofit/>
+          </a:bodyPr>
+          <a:lstStyle/>
+          <a:p>
+            <a:r>
+              <a:rPr lang="en-US" dirty="0"/>
+              <a:t>Create an integer pointer variable and set it</a:t>
+            </a:r>
+          </a:p>
+        </p:txBody>
+      </p:sp>
+      <p:sp>
+        <p:nvSpPr>
+          <p:cNvPr id="30" name="TextBox 29">
+            <a:extLst>
+              <a:ext uri="{FF2B5EF4-FFF2-40B4-BE49-F238E27FC236}">
+                <a16:creationId xmlns:a16="http://schemas.microsoft.com/office/drawing/2014/main" id="{FD7620ED-8FFF-0243-B415-3EBA6F0C3AC5}"/>
+              </a:ext>
+            </a:extLst>
+          </p:cNvPr>
+          <p:cNvSpPr txBox="1"/>
+          <p:nvPr/>
+        </p:nvSpPr>
+        <p:spPr>
+          <a:xfrm>
+            <a:off x="7724466" y="2778363"/>
+            <a:ext cx="306494" cy="369332"/>
+          </a:xfrm>
+          <a:prstGeom prst="rect">
+            <a:avLst/>
+          </a:prstGeom>
+          <a:noFill/>
+        </p:spPr>
+        <p:txBody>
+          <a:bodyPr wrap="none" rtlCol="0">
+            <a:spAutoFit/>
+          </a:bodyPr>
+          <a:lstStyle/>
+          <a:p>
+            <a:r>
+              <a:rPr lang="en-US" dirty="0"/>
+              <a:t>b</a:t>
+            </a:r>
+          </a:p>
+        </p:txBody>
+      </p:sp>
+      <p:sp>
+        <p:nvSpPr>
+          <p:cNvPr id="31" name="TextBox 30">
+            <a:extLst>
+              <a:ext uri="{FF2B5EF4-FFF2-40B4-BE49-F238E27FC236}">
+                <a16:creationId xmlns:a16="http://schemas.microsoft.com/office/drawing/2014/main" id="{337E97FA-23D7-B041-9392-64B7B3B2F324}"/>
+              </a:ext>
+            </a:extLst>
+          </p:cNvPr>
+          <p:cNvSpPr txBox="1"/>
+          <p:nvPr/>
+        </p:nvSpPr>
+        <p:spPr>
+          <a:xfrm>
+            <a:off x="7769374" y="4251567"/>
+            <a:ext cx="306494" cy="369332"/>
+          </a:xfrm>
+          <a:prstGeom prst="rect">
+            <a:avLst/>
+          </a:prstGeom>
+          <a:noFill/>
+        </p:spPr>
+        <p:txBody>
+          <a:bodyPr wrap="none" rtlCol="0">
+            <a:spAutoFit/>
+          </a:bodyPr>
+          <a:lstStyle/>
+          <a:p>
+            <a:r>
+              <a:rPr lang="en-US" dirty="0"/>
+              <a:t>n</a:t>
+            </a:r>
+          </a:p>
+        </p:txBody>
+      </p:sp>
+      <p:sp>
+        <p:nvSpPr>
+          <p:cNvPr id="34" name="TextBox 33">
+            <a:extLst>
+              <a:ext uri="{FF2B5EF4-FFF2-40B4-BE49-F238E27FC236}">
+                <a16:creationId xmlns:a16="http://schemas.microsoft.com/office/drawing/2014/main" id="{3CBC5A7B-4CD8-C344-90E3-8DA91E29660F}"/>
+              </a:ext>
+            </a:extLst>
+          </p:cNvPr>
+          <p:cNvSpPr txBox="1"/>
+          <p:nvPr/>
+        </p:nvSpPr>
+        <p:spPr>
+          <a:xfrm>
+            <a:off x="6866835" y="2979264"/>
+            <a:ext cx="418704" cy="369332"/>
+          </a:xfrm>
+          <a:prstGeom prst="rect">
+            <a:avLst/>
+          </a:prstGeom>
+          <a:noFill/>
+        </p:spPr>
+        <p:txBody>
+          <a:bodyPr wrap="none" lIns="91440" tIns="45720" rIns="91440" bIns="45720" rtlCol="0" anchor="t">
+            <a:spAutoFit/>
+          </a:bodyPr>
+          <a:lstStyle/>
+          <a:p>
+            <a:r>
+              <a:rPr lang="en-US" dirty="0"/>
+              <a:t>28</a:t>
+            </a:r>
+          </a:p>
+        </p:txBody>
+      </p:sp>
+      <p:sp>
+        <p:nvSpPr>
+          <p:cNvPr id="35" name="TextBox 34">
+            <a:extLst>
+              <a:ext uri="{FF2B5EF4-FFF2-40B4-BE49-F238E27FC236}">
+                <a16:creationId xmlns:a16="http://schemas.microsoft.com/office/drawing/2014/main" id="{3EFBBE60-7C5A-0F45-8F06-575A953CCCE2}"/>
+              </a:ext>
+            </a:extLst>
+          </p:cNvPr>
+          <p:cNvSpPr txBox="1"/>
+          <p:nvPr/>
+        </p:nvSpPr>
+        <p:spPr>
+          <a:xfrm>
+            <a:off x="6869902" y="4409398"/>
+            <a:ext cx="418704" cy="369332"/>
+          </a:xfrm>
+          <a:prstGeom prst="rect">
+            <a:avLst/>
+          </a:prstGeom>
+          <a:noFill/>
+        </p:spPr>
+        <p:txBody>
+          <a:bodyPr wrap="none" rtlCol="0">
+            <a:spAutoFit/>
+          </a:bodyPr>
+          <a:lstStyle/>
+          <a:p>
+            <a:r>
+              <a:rPr lang="en-US" dirty="0"/>
+              <a:t>14</a:t>
+            </a:r>
+          </a:p>
+        </p:txBody>
+      </p:sp>
+      <p:sp>
+        <p:nvSpPr>
+          <p:cNvPr id="21" name="TextBox 20">
+            <a:extLst>
+              <a:ext uri="{FF2B5EF4-FFF2-40B4-BE49-F238E27FC236}">
+                <a16:creationId xmlns:a16="http://schemas.microsoft.com/office/drawing/2014/main" id="{035C9B4C-8E36-9E4D-AF7C-5E0419CC4393}"/>
+              </a:ext>
+            </a:extLst>
+          </p:cNvPr>
+          <p:cNvSpPr txBox="1"/>
+          <p:nvPr/>
+        </p:nvSpPr>
+        <p:spPr>
+          <a:xfrm>
+            <a:off x="4220753" y="5617798"/>
+            <a:ext cx="4580735" cy="461665"/>
+          </a:xfrm>
+          <a:prstGeom prst="rect">
+            <a:avLst/>
+          </a:prstGeom>
+          <a:noFill/>
+        </p:spPr>
+        <p:txBody>
+          <a:bodyPr wrap="square" rtlCol="0">
+            <a:spAutoFit/>
+          </a:bodyPr>
+          <a:lstStyle/>
+          <a:p>
+            <a:r>
+              <a:rPr lang="en-US" sz="2400" dirty="0">
                 <a:solidFill>
-                  <a:schemeClr val="accent1"/>
+                  <a:srgbClr val="C00000"/>
                 </a:solidFill>
-              </a14:hiddenFill>
-            </a:ext>
-            <a:ext uri="{91240B29-F687-4F45-9708-019B960494DF}">
-              <a14:hiddenLine xmlns:a14="http://schemas.microsoft.com/office/drawing/2010/main" w="9525">
-                <a:solidFill>
-                  <a:schemeClr val="tx1"/>
-                </a:solidFill>
-                <a:miter lim="800000"/>
-                <a:headEnd/>
-                <a:tailEnd/>
-              </a14:hiddenLine>
-            </a:ext>
-          </a:extLst>
-        </p:spPr>
-      </p:pic>
+              </a:rPr>
+              <a:t>ptr0.c shows seg fault accessing *b</a:t>
+            </a:r>
+          </a:p>
+        </p:txBody>
+      </p:sp>
     </p:spTree>
     <p:extLst>
       <p:ext uri="{BB962C8B-B14F-4D97-AF65-F5344CB8AC3E}">
-        <p14:creationId xmlns:p14="http://schemas.microsoft.com/office/powerpoint/2010/main" val="55281584"/>
+        <p14:creationId xmlns:p14="http://schemas.microsoft.com/office/powerpoint/2010/main" val="3129366765"/>
       </p:ext>
     </p:extLst>
   </p:cSld>
@@ -12855,7 +13065,57 @@
       </p:grpSpPr>
       <p:sp>
         <p:nvSpPr>
-          <p:cNvPr id="2" name="Footer Placeholder 1"/>
+          <p:cNvPr id="2" name="Title 1"/>
+          <p:cNvSpPr>
+            <a:spLocks noGrp="1"/>
+          </p:cNvSpPr>
+          <p:nvPr>
+            <p:ph type="title"/>
+          </p:nvPr>
+        </p:nvSpPr>
+        <p:spPr/>
+        <p:txBody>
+          <a:bodyPr/>
+          <a:lstStyle/>
+          <a:p>
+            <a:r>
+              <a:rPr lang="en-US" dirty="0"/>
+              <a:t>Functions with Output Parameters</a:t>
+            </a:r>
+          </a:p>
+        </p:txBody>
+      </p:sp>
+      <p:sp>
+        <p:nvSpPr>
+          <p:cNvPr id="3" name="Content Placeholder 2"/>
+          <p:cNvSpPr>
+            <a:spLocks noGrp="1"/>
+          </p:cNvSpPr>
+          <p:nvPr>
+            <p:ph idx="1"/>
+          </p:nvPr>
+        </p:nvSpPr>
+        <p:spPr/>
+        <p:txBody>
+          <a:bodyPr/>
+          <a:lstStyle/>
+          <a:p>
+            <a:r>
+              <a:rPr lang="en-US" dirty="0"/>
+              <a:t>We’ve used the return statement to send back one result value from a function.</a:t>
+            </a:r>
+          </a:p>
+          <a:p>
+            <a:r>
+              <a:rPr lang="en-US" dirty="0"/>
+              <a:t>We can also use output parameters to return multiple results from a function.</a:t>
+            </a:r>
+          </a:p>
+        </p:txBody>
+      </p:sp>
+      <p:sp>
+        <p:nvSpPr>
+          <p:cNvPr id="4" name="Footer Placeholder 3"/>
           <p:cNvSpPr>
             <a:spLocks noGrp="1"/>
           </p:cNvSpPr>
@@ -12877,7 +13137,7 @@
       </p:sp>
       <p:sp>
         <p:nvSpPr>
-          <p:cNvPr id="3" name="Slide Number Placeholder 2"/>
+          <p:cNvPr id="5" name="Slide Number Placeholder 4"/>
           <p:cNvSpPr>
             <a:spLocks noGrp="1"/>
           </p:cNvSpPr>
@@ -12900,7 +13160,7 @@
       </p:sp>
       <p:pic>
         <p:nvPicPr>
-          <p:cNvPr id="9218" name="Picture 2"/>
+          <p:cNvPr id="4098" name="Picture 2"/>
           <p:cNvPicPr>
             <a:picLocks noChangeAspect="1" noChangeArrowheads="1"/>
           </p:cNvPicPr>
@@ -12921,8 +13181,8 @@
         </p:blipFill>
         <p:spPr bwMode="auto">
           <a:xfrm>
-            <a:off x="1219200" y="914400"/>
-            <a:ext cx="6324600" cy="4114800"/>
+            <a:off x="60634" y="4038600"/>
+            <a:ext cx="9083365" cy="1687666"/>
           </a:xfrm>
           <a:prstGeom prst="rect">
             <a:avLst/>
@@ -12955,7 +13215,7 @@
     </p:spTree>
     <p:extLst>
       <p:ext uri="{BB962C8B-B14F-4D97-AF65-F5344CB8AC3E}">
-        <p14:creationId xmlns:p14="http://schemas.microsoft.com/office/powerpoint/2010/main" val="2741459964"/>
+        <p14:creationId xmlns:p14="http://schemas.microsoft.com/office/powerpoint/2010/main" val="55281584"/>
       </p:ext>
     </p:extLst>
   </p:cSld>
@@ -13029,7 +13289,7 @@
       </p:sp>
       <p:pic>
         <p:nvPicPr>
-          <p:cNvPr id="10242" name="Picture 2"/>
+          <p:cNvPr id="9218" name="Picture 2"/>
           <p:cNvPicPr>
             <a:picLocks noChangeAspect="1" noChangeArrowheads="1"/>
           </p:cNvPicPr>
@@ -13050,8 +13310,8 @@
         </p:blipFill>
         <p:spPr bwMode="auto">
           <a:xfrm>
-            <a:off x="100172" y="762000"/>
-            <a:ext cx="9043828" cy="2400886"/>
+            <a:off x="1219200" y="914400"/>
+            <a:ext cx="6324600" cy="4114800"/>
           </a:xfrm>
           <a:prstGeom prst="rect">
             <a:avLst/>
@@ -13084,7 +13344,7 @@
     </p:spTree>
     <p:extLst>
       <p:ext uri="{BB962C8B-B14F-4D97-AF65-F5344CB8AC3E}">
-        <p14:creationId xmlns:p14="http://schemas.microsoft.com/office/powerpoint/2010/main" val="2455360513"/>
+        <p14:creationId xmlns:p14="http://schemas.microsoft.com/office/powerpoint/2010/main" val="2741459964"/>
       </p:ext>
     </p:extLst>
   </p:cSld>
@@ -13113,63 +13373,7 @@
       </p:grpSpPr>
       <p:sp>
         <p:nvSpPr>
-          <p:cNvPr id="2" name="Title 1"/>
-          <p:cNvSpPr>
-            <a:spLocks noGrp="1"/>
-          </p:cNvSpPr>
-          <p:nvPr>
-            <p:ph type="title"/>
-          </p:nvPr>
-        </p:nvSpPr>
-        <p:spPr/>
-        <p:txBody>
-          <a:bodyPr/>
-          <a:lstStyle/>
-          <a:p>
-            <a:r>
-              <a:rPr lang="en-US" dirty="0"/>
-              <a:t>Meaning of Symbol *</a:t>
-            </a:r>
-          </a:p>
-        </p:txBody>
-      </p:sp>
-      <p:sp>
-        <p:nvSpPr>
-          <p:cNvPr id="3" name="Content Placeholder 2"/>
-          <p:cNvSpPr>
-            <a:spLocks noGrp="1"/>
-          </p:cNvSpPr>
-          <p:nvPr>
-            <p:ph idx="1"/>
-          </p:nvPr>
-        </p:nvSpPr>
-        <p:spPr/>
-        <p:txBody>
-          <a:bodyPr/>
-          <a:lstStyle/>
-          <a:p>
-            <a:r>
-              <a:rPr lang="en-US" dirty="0"/>
-              <a:t>binary operator for multiplication</a:t>
-            </a:r>
-          </a:p>
-          <a:p>
-            <a:r>
-              <a:rPr lang="en-US" dirty="0"/>
-              <a:t>“pointer to” when used when declaring a variable or a function parameters</a:t>
-            </a:r>
-          </a:p>
-          <a:p>
-            <a:r>
-              <a:rPr lang="en-US" dirty="0"/>
-              <a:t>unary indirection operator in a function body</a:t>
-            </a:r>
-          </a:p>
-        </p:txBody>
-      </p:sp>
-      <p:sp>
-        <p:nvSpPr>
-          <p:cNvPr id="4" name="Footer Placeholder 3"/>
+          <p:cNvPr id="2" name="Footer Placeholder 1"/>
           <p:cNvSpPr>
             <a:spLocks noGrp="1"/>
           </p:cNvSpPr>
@@ -13191,7 +13395,7 @@
       </p:sp>
       <p:sp>
         <p:nvSpPr>
-          <p:cNvPr id="5" name="Slide Number Placeholder 4"/>
+          <p:cNvPr id="3" name="Slide Number Placeholder 2"/>
           <p:cNvSpPr>
             <a:spLocks noGrp="1"/>
           </p:cNvSpPr>
@@ -13212,10 +13416,64 @@
           </a:p>
         </p:txBody>
       </p:sp>
+      <p:pic>
+        <p:nvPicPr>
+          <p:cNvPr id="10242" name="Picture 2"/>
+          <p:cNvPicPr>
+            <a:picLocks noChangeAspect="1" noChangeArrowheads="1"/>
+          </p:cNvPicPr>
+          <p:nvPr/>
+        </p:nvPicPr>
+        <p:blipFill>
+          <a:blip r:embed="rId2">
+            <a:extLst>
+              <a:ext uri="{28A0092B-C50C-407E-A947-70E740481C1C}">
+                <a14:useLocalDpi xmlns:a14="http://schemas.microsoft.com/office/drawing/2010/main" val="0"/>
+              </a:ext>
+            </a:extLst>
+          </a:blip>
+          <a:srcRect/>
+          <a:stretch>
+            <a:fillRect/>
+          </a:stretch>
+        </p:blipFill>
+        <p:spPr bwMode="auto">
+          <a:xfrm>
+            <a:off x="100172" y="762000"/>
+            <a:ext cx="9043828" cy="2400886"/>
+          </a:xfrm>
+          <a:prstGeom prst="rect">
+            <a:avLst/>
+          </a:prstGeom>
+          <a:noFill/>
+          <a:ln>
+            <a:noFill/>
+          </a:ln>
+          <a:extLst>
+            <a:ext uri="{909E8E84-426E-40DD-AFC4-6F175D3DCCD1}">
+              <a14:hiddenFill xmlns:a14="http://schemas.microsoft.com/office/drawing/2010/main">
+                <a:solidFill>
+                  <a:schemeClr val="accent1"/>
+                </a:solidFill>
+              </a14:hiddenFill>
+            </a:ext>
+            <a:ext uri="{91240B29-F687-4F45-9708-019B960494DF}">
+              <a14:hiddenLine xmlns:a14="http://schemas.microsoft.com/office/drawing/2010/main" w="9525">
+                <a:solidFill>
+                  <a:schemeClr val="tx1"/>
+                </a:solidFill>
+                <a:miter lim="800000"/>
+                <a:headEnd/>
+                <a:tailEnd/>
+              </a14:hiddenLine>
+            </a:ext>
+          </a:extLst>
+        </p:spPr>
+      </p:pic>
     </p:spTree>
     <p:extLst>
       <p:ext uri="{BB962C8B-B14F-4D97-AF65-F5344CB8AC3E}">
-        <p14:creationId xmlns:p14="http://schemas.microsoft.com/office/powerpoint/2010/main" val="1689844619"/>
+        <p14:creationId xmlns:p14="http://schemas.microsoft.com/office/powerpoint/2010/main" val="2455360513"/>
       </p:ext>
     </p:extLst>
   </p:cSld>
@@ -13249,7 +13507,7 @@
             <a:spLocks noGrp="1"/>
           </p:cNvSpPr>
           <p:nvPr>
-            <p:ph type="ctrTitle"/>
+            <p:ph type="title"/>
           </p:nvPr>
         </p:nvSpPr>
         <p:spPr/>
@@ -13259,27 +13517,19 @@
           <a:p>
             <a:r>
               <a:rPr lang="en-US" dirty="0"/>
-              <a:t>Multiple Calls to a Function with </a:t>
-            </a:r>
-            <a:r>
-              <a:rPr lang="en-US" dirty="0" err="1"/>
-              <a:t>Input/Output</a:t>
-            </a:r>
-            <a:r>
-              <a:rPr lang="en-US" dirty="0"/>
-              <a:t> Parameters</a:t>
-            </a:r>
-          </a:p>
-        </p:txBody>
-      </p:sp>
-      <p:sp>
-        <p:nvSpPr>
-          <p:cNvPr id="3" name="Subtitle 2"/>
-          <p:cNvSpPr>
-            <a:spLocks noGrp="1"/>
-          </p:cNvSpPr>
-          <p:nvPr>
-            <p:ph type="subTitle" idx="1"/>
+              <a:t>Meaning of Symbol *</a:t>
+            </a:r>
+          </a:p>
+        </p:txBody>
+      </p:sp>
+      <p:sp>
+        <p:nvSpPr>
+          <p:cNvPr id="3" name="Content Placeholder 2"/>
+          <p:cNvSpPr>
+            <a:spLocks noGrp="1"/>
+          </p:cNvSpPr>
+          <p:nvPr>
+            <p:ph idx="1"/>
           </p:nvPr>
         </p:nvSpPr>
         <p:spPr/>
@@ -13289,7 +13539,19 @@
           <a:p>
             <a:r>
               <a:rPr lang="en-US" dirty="0"/>
-              <a:t>An example of sorting data</a:t>
+              <a:t>binary operator for multiplication</a:t>
+            </a:r>
+          </a:p>
+          <a:p>
+            <a:r>
+              <a:rPr lang="en-US" dirty="0"/>
+              <a:t>“pointer to” when used when declaring a variable or a function parameters</a:t>
+            </a:r>
+          </a:p>
+          <a:p>
+            <a:r>
+              <a:rPr lang="en-US" dirty="0"/>
+              <a:t>unary indirection operator in a function body</a:t>
             </a:r>
           </a:p>
         </p:txBody>
@@ -13342,7 +13604,7 @@
     </p:spTree>
     <p:extLst>
       <p:ext uri="{BB962C8B-B14F-4D97-AF65-F5344CB8AC3E}">
-        <p14:creationId xmlns:p14="http://schemas.microsoft.com/office/powerpoint/2010/main" val="2470632231"/>
+        <p14:creationId xmlns:p14="http://schemas.microsoft.com/office/powerpoint/2010/main" val="1689844619"/>
       </p:ext>
     </p:extLst>
   </p:cSld>
@@ -13492,7 +13754,59 @@
       </p:grpSpPr>
       <p:sp>
         <p:nvSpPr>
-          <p:cNvPr id="2" name="Footer Placeholder 1"/>
+          <p:cNvPr id="2" name="Title 1"/>
+          <p:cNvSpPr>
+            <a:spLocks noGrp="1"/>
+          </p:cNvSpPr>
+          <p:nvPr>
+            <p:ph type="ctrTitle"/>
+          </p:nvPr>
+        </p:nvSpPr>
+        <p:spPr/>
+        <p:txBody>
+          <a:bodyPr/>
+          <a:lstStyle/>
+          <a:p>
+            <a:r>
+              <a:rPr lang="en-US" dirty="0"/>
+              <a:t>Multiple Calls to a Function with </a:t>
+            </a:r>
+            <a:r>
+              <a:rPr lang="en-US" dirty="0" err="1"/>
+              <a:t>Input/Output</a:t>
+            </a:r>
+            <a:r>
+              <a:rPr lang="en-US" dirty="0"/>
+              <a:t> Parameters</a:t>
+            </a:r>
+          </a:p>
+        </p:txBody>
+      </p:sp>
+      <p:sp>
+        <p:nvSpPr>
+          <p:cNvPr id="3" name="Subtitle 2"/>
+          <p:cNvSpPr>
+            <a:spLocks noGrp="1"/>
+          </p:cNvSpPr>
+          <p:nvPr>
+            <p:ph type="subTitle" idx="1"/>
+          </p:nvPr>
+        </p:nvSpPr>
+        <p:spPr/>
+        <p:txBody>
+          <a:bodyPr/>
+          <a:lstStyle/>
+          <a:p>
+            <a:r>
+              <a:rPr lang="en-US" dirty="0"/>
+              <a:t>An example of sorting data</a:t>
+            </a:r>
+          </a:p>
+        </p:txBody>
+      </p:sp>
+      <p:sp>
+        <p:nvSpPr>
+          <p:cNvPr id="4" name="Footer Placeholder 3"/>
           <p:cNvSpPr>
             <a:spLocks noGrp="1"/>
           </p:cNvSpPr>
@@ -13514,7 +13828,7 @@
       </p:sp>
       <p:sp>
         <p:nvSpPr>
-          <p:cNvPr id="3" name="Slide Number Placeholder 2"/>
+          <p:cNvPr id="5" name="Slide Number Placeholder 4"/>
           <p:cNvSpPr>
             <a:spLocks noGrp="1"/>
           </p:cNvSpPr>
@@ -13530,6 +13844,81 @@
             <a:fld id="{85A8DA42-601D-40A8-83CA-2F2CBDE5F9F0}" type="slidenum">
               <a:rPr lang="en-US" smtClean="0"/>
               <a:t>30</a:t>
+            </a:fld>
+            <a:endParaRPr lang="en-US"/>
+          </a:p>
+        </p:txBody>
+      </p:sp>
+    </p:spTree>
+    <p:extLst>
+      <p:ext uri="{BB962C8B-B14F-4D97-AF65-F5344CB8AC3E}">
+        <p14:creationId xmlns:p14="http://schemas.microsoft.com/office/powerpoint/2010/main" val="2470632231"/>
+      </p:ext>
+    </p:extLst>
+  </p:cSld>
+  <p:clrMapOvr>
+    <a:masterClrMapping/>
+  </p:clrMapOvr>
+</p:sld>
+</file>
+
+<file path=ppt/slides/slide31.xml><?xml version="1.0" encoding="utf-8"?>
+<p:sld xmlns:a="http://schemas.openxmlformats.org/drawingml/2006/main" xmlns:r="http://schemas.openxmlformats.org/officeDocument/2006/relationships" xmlns:p="http://schemas.openxmlformats.org/presentationml/2006/main">
+  <p:cSld>
+    <p:spTree>
+      <p:nvGrpSpPr>
+        <p:cNvPr id="1" name=""/>
+        <p:cNvGrpSpPr/>
+        <p:nvPr/>
+      </p:nvGrpSpPr>
+      <p:grpSpPr>
+        <a:xfrm>
+          <a:off x="0" y="0"/>
+          <a:ext cx="0" cy="0"/>
+          <a:chOff x="0" y="0"/>
+          <a:chExt cx="0" cy="0"/>
+        </a:xfrm>
+      </p:grpSpPr>
+      <p:sp>
+        <p:nvSpPr>
+          <p:cNvPr id="2" name="Footer Placeholder 1"/>
+          <p:cNvSpPr>
+            <a:spLocks noGrp="1"/>
+          </p:cNvSpPr>
+          <p:nvPr>
+            <p:ph type="ftr" sz="quarter" idx="11"/>
+          </p:nvPr>
+        </p:nvSpPr>
+        <p:spPr/>
+        <p:txBody>
+          <a:bodyPr/>
+          <a:lstStyle/>
+          <a:p>
+            <a:r>
+              <a:rPr lang="en-US"/>
+              <a:t>© 2016 Pearson Education, Inc., Hoboken, NJ.  All rights reserved.</a:t>
+            </a:r>
+          </a:p>
+        </p:txBody>
+      </p:sp>
+      <p:sp>
+        <p:nvSpPr>
+          <p:cNvPr id="3" name="Slide Number Placeholder 2"/>
+          <p:cNvSpPr>
+            <a:spLocks noGrp="1"/>
+          </p:cNvSpPr>
+          <p:nvPr>
+            <p:ph type="sldNum" sz="quarter" idx="12"/>
+          </p:nvPr>
+        </p:nvSpPr>
+        <p:spPr/>
+        <p:txBody>
+          <a:bodyPr/>
+          <a:lstStyle/>
+          <a:p>
+            <a:fld id="{85A8DA42-601D-40A8-83CA-2F2CBDE5F9F0}" type="slidenum">
+              <a:rPr lang="en-US" smtClean="0"/>
+              <a:t>31</a:t>
             </a:fld>
             <a:endParaRPr lang="en-US"/>
           </a:p>
@@ -14870,193 +15259,117 @@
         </p:nvSpPr>
         <p:spPr/>
         <p:txBody>
+          <a:bodyPr/>
+          <a:lstStyle/>
+          <a:p>
+            <a:r>
+              <a:rPr lang="en-US" dirty="0"/>
+              <a:t>Pointers to Files</a:t>
+            </a:r>
+          </a:p>
+        </p:txBody>
+      </p:sp>
+      <p:sp>
+        <p:nvSpPr>
+          <p:cNvPr id="3" name="Content Placeholder 2"/>
+          <p:cNvSpPr>
+            <a:spLocks noGrp="1"/>
+          </p:cNvSpPr>
+          <p:nvPr>
+            <p:ph idx="1"/>
+          </p:nvPr>
+        </p:nvSpPr>
+        <p:spPr/>
+        <p:txBody>
           <a:bodyPr>
-            <a:normAutofit/>
+            <a:normAutofit lnSpcReduction="10000"/>
           </a:bodyPr>
           <a:lstStyle/>
           <a:p>
             <a:r>
+              <a:rPr lang="en-US" dirty="0"/>
+              <a:t>C allows a program to explicitly name a file for input or output.</a:t>
+            </a:r>
+          </a:p>
+          <a:p>
+            <a:r>
+              <a:rPr lang="en-US" dirty="0"/>
+              <a:t>Declare file pointers:</a:t>
+            </a:r>
+          </a:p>
+          <a:p>
+            <a:pPr lvl="1"/>
+            <a:r>
+              <a:rPr lang="en-US" dirty="0"/>
+              <a:t>FILE  *</a:t>
+            </a:r>
+            <a:r>
               <a:rPr lang="en-US" dirty="0" err="1"/>
-              <a:t>sizeof</a:t>
-            </a:r>
-            <a:r>
-              <a:rPr lang="en-US" dirty="0"/>
-              <a:t>() function</a:t>
-            </a:r>
-          </a:p>
-        </p:txBody>
-      </p:sp>
-      <p:sp>
-        <p:nvSpPr>
-          <p:cNvPr id="3" name="Content Placeholder 2"/>
-          <p:cNvSpPr>
-            <a:spLocks noGrp="1"/>
-          </p:cNvSpPr>
-          <p:nvPr>
-            <p:ph idx="1"/>
-          </p:nvPr>
-        </p:nvSpPr>
-        <p:spPr/>
-        <p:txBody>
-          <a:bodyPr>
-            <a:normAutofit/>
-          </a:bodyPr>
-          <a:lstStyle/>
-          <a:p>
-            <a:pPr algn="l" rtl="0" fontAlgn="base">
-              <a:buFont typeface="Arial" panose="020B0604020202020204" pitchFamily="34" charset="0"/>
-              <a:buChar char="•"/>
-            </a:pPr>
-            <a:r>
-              <a:rPr lang="en-US" b="0" i="0" u="none" strike="noStrike" dirty="0">
-                <a:solidFill>
-                  <a:srgbClr val="000000"/>
-                </a:solidFill>
-                <a:effectLst/>
-                <a:latin typeface="Calibri" panose="020F0502020204030204" pitchFamily="34" charset="0"/>
-              </a:rPr>
-              <a:t>Gives the number of bytes that a variable or value takes up</a:t>
-            </a:r>
-          </a:p>
-          <a:p>
-            <a:pPr marL="0" indent="0" algn="l" rtl="0" fontAlgn="base">
-              <a:buNone/>
-            </a:pPr>
-            <a:r>
-              <a:rPr lang="en-US" dirty="0" err="1">
-                <a:solidFill>
-                  <a:schemeClr val="accent4"/>
-                </a:solidFill>
-                <a:latin typeface="Calibri" panose="020F0502020204030204" pitchFamily="34" charset="0"/>
-              </a:rPr>
-              <a:t>sizeof</a:t>
-            </a:r>
-            <a:r>
-              <a:rPr lang="en-US" dirty="0">
-                <a:solidFill>
-                  <a:schemeClr val="accent4"/>
-                </a:solidFill>
-                <a:latin typeface="Calibri" panose="020F0502020204030204" pitchFamily="34" charset="0"/>
-              </a:rPr>
-              <a:t>(m)</a:t>
-            </a:r>
-            <a:endParaRPr lang="en-US" b="0" i="0" u="none" strike="noStrike" dirty="0">
-              <a:solidFill>
-                <a:schemeClr val="accent4"/>
-              </a:solidFill>
-              <a:effectLst/>
-              <a:latin typeface="Calibri" panose="020F0502020204030204" pitchFamily="34" charset="0"/>
-            </a:endParaRPr>
-          </a:p>
-          <a:p>
-            <a:pPr algn="l" rtl="0" fontAlgn="base">
-              <a:buFont typeface="Arial" panose="020B0604020202020204" pitchFamily="34" charset="0"/>
-              <a:buChar char="•"/>
-            </a:pPr>
-            <a:r>
-              <a:rPr lang="en-US" dirty="0">
-                <a:solidFill>
-                  <a:srgbClr val="000000"/>
-                </a:solidFill>
-                <a:latin typeface="Calibri" panose="020F0502020204030204" pitchFamily="34" charset="0"/>
-              </a:rPr>
-              <a:t>On our server:</a:t>
-            </a:r>
-          </a:p>
-          <a:p>
-            <a:pPr lvl="1" fontAlgn="base">
-              <a:buFont typeface="Arial" panose="020B0604020202020204" pitchFamily="34" charset="0"/>
-              <a:buChar char="•"/>
-            </a:pPr>
-            <a:r>
-              <a:rPr lang="en-US" dirty="0">
-                <a:solidFill>
-                  <a:srgbClr val="000000"/>
-                </a:solidFill>
-                <a:latin typeface="Calibri" panose="020F0502020204030204" pitchFamily="34" charset="0"/>
-              </a:rPr>
-              <a:t>Char: 1 bytes</a:t>
-            </a:r>
-          </a:p>
-          <a:p>
-            <a:pPr lvl="1" fontAlgn="base">
-              <a:buFont typeface="Arial" panose="020B0604020202020204" pitchFamily="34" charset="0"/>
-              <a:buChar char="•"/>
-            </a:pPr>
-            <a:r>
-              <a:rPr lang="en-US" dirty="0">
-                <a:solidFill>
-                  <a:srgbClr val="000000"/>
-                </a:solidFill>
-                <a:latin typeface="Calibri" panose="020F0502020204030204" pitchFamily="34" charset="0"/>
-              </a:rPr>
-              <a:t>Int: 4 bytes</a:t>
-            </a:r>
-          </a:p>
-          <a:p>
-            <a:pPr lvl="1" fontAlgn="base">
-              <a:buFont typeface="Arial" panose="020B0604020202020204" pitchFamily="34" charset="0"/>
-              <a:buChar char="•"/>
-            </a:pPr>
-            <a:r>
-              <a:rPr lang="en-US" dirty="0">
-                <a:solidFill>
-                  <a:srgbClr val="000000"/>
-                </a:solidFill>
-                <a:latin typeface="Calibri" panose="020F0502020204030204" pitchFamily="34" charset="0"/>
-              </a:rPr>
-              <a:t>Float: 4 bytes</a:t>
-            </a:r>
-          </a:p>
-          <a:p>
-            <a:pPr lvl="1" fontAlgn="base">
-              <a:buFont typeface="Arial" panose="020B0604020202020204" pitchFamily="34" charset="0"/>
-              <a:buChar char="•"/>
-            </a:pPr>
-            <a:r>
-              <a:rPr lang="en-US" dirty="0">
-                <a:solidFill>
-                  <a:srgbClr val="000000"/>
-                </a:solidFill>
-                <a:latin typeface="Calibri" panose="020F0502020204030204" pitchFamily="34" charset="0"/>
-              </a:rPr>
-              <a:t>Double: 8 bytes</a:t>
-            </a:r>
-          </a:p>
-          <a:p>
-            <a:pPr lvl="1" fontAlgn="base">
-              <a:buFont typeface="Arial" panose="020B0604020202020204" pitchFamily="34" charset="0"/>
-              <a:buChar char="•"/>
-            </a:pPr>
-            <a:endParaRPr lang="en-US" dirty="0">
-              <a:solidFill>
-                <a:srgbClr val="7030A0"/>
-              </a:solidFill>
-            </a:endParaRPr>
-          </a:p>
-          <a:p>
-            <a:pPr marL="914400" lvl="2" indent="0">
-              <a:buNone/>
-            </a:pPr>
-            <a:endParaRPr lang="en-US" dirty="0"/>
-          </a:p>
-          <a:p>
-            <a:pPr marL="914400" lvl="2" indent="0">
-              <a:buNone/>
-            </a:pPr>
-            <a:endParaRPr lang="en-US" dirty="0"/>
-          </a:p>
-          <a:p>
-            <a:pPr marL="914400" lvl="2" indent="0">
-              <a:buNone/>
-            </a:pPr>
-            <a:endParaRPr lang="en-US" dirty="0"/>
-          </a:p>
-          <a:p>
-            <a:pPr marL="914400" lvl="2" indent="0">
-              <a:buNone/>
-            </a:pPr>
-            <a:endParaRPr lang="en-US" dirty="0"/>
+              <a:t>inp</a:t>
+            </a:r>
+            <a:r>
+              <a:rPr lang="en-US" dirty="0"/>
+              <a:t>;	/* pointer to input file */</a:t>
+            </a:r>
+          </a:p>
+          <a:p>
+            <a:pPr lvl="1"/>
+            <a:r>
+              <a:rPr lang="en-US" dirty="0"/>
+              <a:t>FILE  *</a:t>
+            </a:r>
+            <a:r>
+              <a:rPr lang="en-US" dirty="0" err="1"/>
+              <a:t>outp</a:t>
+            </a:r>
+            <a:r>
+              <a:rPr lang="en-US" dirty="0"/>
+              <a:t>;	/* pointer to output file */</a:t>
+            </a:r>
+          </a:p>
+          <a:p>
+            <a:r>
+              <a:rPr lang="en-US" dirty="0"/>
+              <a:t>Prepare for input or output before permitting access:</a:t>
+            </a:r>
+          </a:p>
+          <a:p>
+            <a:pPr lvl="1"/>
+            <a:r>
+              <a:rPr lang="en-US" dirty="0" err="1"/>
+              <a:t>inp</a:t>
+            </a:r>
+            <a:r>
+              <a:rPr lang="en-US" dirty="0"/>
+              <a:t> = </a:t>
+            </a:r>
+            <a:r>
+              <a:rPr lang="en-US" dirty="0" err="1"/>
+              <a:t>fopen</a:t>
+            </a:r>
+            <a:r>
+              <a:rPr lang="en-US" dirty="0"/>
+              <a:t>(“infile.txt”, “r”);</a:t>
+            </a:r>
+          </a:p>
+          <a:p>
+            <a:pPr lvl="1"/>
+            <a:r>
+              <a:rPr lang="en-US" dirty="0" err="1"/>
+              <a:t>outp</a:t>
+            </a:r>
+            <a:r>
+              <a:rPr lang="en-US" dirty="0"/>
+              <a:t> = </a:t>
+            </a:r>
+            <a:r>
+              <a:rPr lang="en-US" dirty="0" err="1"/>
+              <a:t>fopen</a:t>
+            </a:r>
+            <a:r>
+              <a:rPr lang="en-US" dirty="0"/>
+              <a:t>(“outfile.txt”, “w”);</a:t>
+            </a:r>
           </a:p>
         </p:txBody>
       </p:sp>
@@ -15108,7 +15421,7 @@
     </p:spTree>
     <p:extLst>
       <p:ext uri="{BB962C8B-B14F-4D97-AF65-F5344CB8AC3E}">
-        <p14:creationId xmlns:p14="http://schemas.microsoft.com/office/powerpoint/2010/main" val="2396800092"/>
+        <p14:creationId xmlns:p14="http://schemas.microsoft.com/office/powerpoint/2010/main" val="3134779782"/>
       </p:ext>
     </p:extLst>
   </p:cSld>

</xml_diff>